<commit_message>
More Classes Lecture updated
</commit_message>
<xml_diff>
--- a/slides/On-Campus/09_03_MoreClasses.pptx
+++ b/slides/On-Campus/09_03_MoreClasses.pptx
@@ -146,510 +146,45 @@
 <pc:chgInfo xmlns:a="http://schemas.openxmlformats.org/drawingml/2006/main" xmlns:r="http://schemas.openxmlformats.org/officeDocument/2006/relationships" xmlns:ac="http://schemas.microsoft.com/office/drawing/2013/main/command" xmlns:pc="http://schemas.microsoft.com/office/powerpoint/2013/main/command">
   <pc:docChgLst>
     <pc:chgData name="Marcia Moraes" userId="c9c67e8a-58e2-4733-9a1c-5d44fec4775b" providerId="ADAL" clId="{D79FB4EA-AD9E-48DA-9A09-B5201FDCFA77}"/>
-    <pc:docChg chg="undo custSel addSld delSld modSld sldOrd modMainMaster">
-      <pc:chgData name="Marcia Moraes" userId="c9c67e8a-58e2-4733-9a1c-5d44fec4775b" providerId="ADAL" clId="{D79FB4EA-AD9E-48DA-9A09-B5201FDCFA77}" dt="2023-03-23T22:51:05.183" v="919" actId="20577"/>
+  </pc:docChgLst>
+  <pc:docChgLst>
+    <pc:chgData name="Marcia Moraes" userId="c9c67e8a-58e2-4733-9a1c-5d44fec4775b" providerId="ADAL" clId="{CA673059-942D-4FC2-B7DB-95A394EB4144}"/>
+    <pc:docChg chg="custSel modSld">
+      <pc:chgData name="Marcia Moraes" userId="c9c67e8a-58e2-4733-9a1c-5d44fec4775b" providerId="ADAL" clId="{CA673059-942D-4FC2-B7DB-95A394EB4144}" dt="2023-10-11T00:49:38.468" v="2" actId="1076"/>
       <pc:docMkLst>
         <pc:docMk/>
       </pc:docMkLst>
       <pc:sldChg chg="addSp delSp modSp">
-        <pc:chgData name="Marcia Moraes" userId="c9c67e8a-58e2-4733-9a1c-5d44fec4775b" providerId="ADAL" clId="{D79FB4EA-AD9E-48DA-9A09-B5201FDCFA77}" dt="2023-03-23T19:32:29.198" v="443" actId="6549"/>
-        <pc:sldMkLst>
-          <pc:docMk/>
-          <pc:sldMk cId="2012767177" sldId="257"/>
-        </pc:sldMkLst>
-        <pc:spChg chg="mod">
-          <ac:chgData name="Marcia Moraes" userId="c9c67e8a-58e2-4733-9a1c-5d44fec4775b" providerId="ADAL" clId="{D79FB4EA-AD9E-48DA-9A09-B5201FDCFA77}" dt="2023-03-23T18:05:18" v="359" actId="1076"/>
-          <ac:spMkLst>
-            <pc:docMk/>
-            <pc:sldMk cId="2012767177" sldId="257"/>
-            <ac:spMk id="4" creationId="{F6F7E663-32CE-E448-95F9-79C015848441}"/>
-          </ac:spMkLst>
-        </pc:spChg>
-        <pc:spChg chg="del mod">
-          <ac:chgData name="Marcia Moraes" userId="c9c67e8a-58e2-4733-9a1c-5d44fec4775b" providerId="ADAL" clId="{D79FB4EA-AD9E-48DA-9A09-B5201FDCFA77}" dt="2023-03-23T18:05:09.913" v="356" actId="478"/>
-          <ac:spMkLst>
-            <pc:docMk/>
-            <pc:sldMk cId="2012767177" sldId="257"/>
-            <ac:spMk id="5" creationId="{F3430565-9E8F-1349-833D-D81F25510834}"/>
-          </ac:spMkLst>
-        </pc:spChg>
-        <pc:spChg chg="mod">
-          <ac:chgData name="Marcia Moraes" userId="c9c67e8a-58e2-4733-9a1c-5d44fec4775b" providerId="ADAL" clId="{D79FB4EA-AD9E-48DA-9A09-B5201FDCFA77}" dt="2023-03-23T18:06:12.729" v="412" actId="20577"/>
-          <ac:spMkLst>
-            <pc:docMk/>
-            <pc:sldMk cId="2012767177" sldId="257"/>
-            <ac:spMk id="6" creationId="{070BA3BB-E4AC-1442-9C1B-434DA00352F6}"/>
-          </ac:spMkLst>
-        </pc:spChg>
-        <pc:spChg chg="add mod">
-          <ac:chgData name="Marcia Moraes" userId="c9c67e8a-58e2-4733-9a1c-5d44fec4775b" providerId="ADAL" clId="{D79FB4EA-AD9E-48DA-9A09-B5201FDCFA77}" dt="2023-03-23T19:32:29.198" v="443" actId="6549"/>
-          <ac:spMkLst>
-            <pc:docMk/>
-            <pc:sldMk cId="2012767177" sldId="257"/>
-            <ac:spMk id="7" creationId="{E625CE9C-C39F-4266-B08E-4FC866EEAFBC}"/>
-          </ac:spMkLst>
-        </pc:spChg>
-      </pc:sldChg>
-      <pc:sldChg chg="delSp modSp delAnim">
-        <pc:chgData name="Marcia Moraes" userId="c9c67e8a-58e2-4733-9a1c-5d44fec4775b" providerId="ADAL" clId="{D79FB4EA-AD9E-48DA-9A09-B5201FDCFA77}" dt="2023-03-23T19:54:43.331" v="554" actId="1076"/>
-        <pc:sldMkLst>
-          <pc:docMk/>
-          <pc:sldMk cId="2465426233" sldId="258"/>
-        </pc:sldMkLst>
-        <pc:spChg chg="mod">
-          <ac:chgData name="Marcia Moraes" userId="c9c67e8a-58e2-4733-9a1c-5d44fec4775b" providerId="ADAL" clId="{D79FB4EA-AD9E-48DA-9A09-B5201FDCFA77}" dt="2023-03-23T19:43:01.570" v="482" actId="1076"/>
-          <ac:spMkLst>
-            <pc:docMk/>
-            <pc:sldMk cId="2465426233" sldId="258"/>
-            <ac:spMk id="2" creationId="{7F5F8C1B-DC3E-E841-B6A5-63177E30B362}"/>
-          </ac:spMkLst>
-        </pc:spChg>
-        <pc:spChg chg="mod">
-          <ac:chgData name="Marcia Moraes" userId="c9c67e8a-58e2-4733-9a1c-5d44fec4775b" providerId="ADAL" clId="{D79FB4EA-AD9E-48DA-9A09-B5201FDCFA77}" dt="2023-03-23T19:54:25.252" v="550" actId="1076"/>
-          <ac:spMkLst>
-            <pc:docMk/>
-            <pc:sldMk cId="2465426233" sldId="258"/>
-            <ac:spMk id="3" creationId="{4EEDFB7D-D77B-AE41-A1C6-ED4C90C27C9E}"/>
-          </ac:spMkLst>
-        </pc:spChg>
-        <pc:spChg chg="mod">
-          <ac:chgData name="Marcia Moraes" userId="c9c67e8a-58e2-4733-9a1c-5d44fec4775b" providerId="ADAL" clId="{D79FB4EA-AD9E-48DA-9A09-B5201FDCFA77}" dt="2023-03-23T19:54:32.439" v="552" actId="14100"/>
-          <ac:spMkLst>
-            <pc:docMk/>
-            <pc:sldMk cId="2465426233" sldId="258"/>
-            <ac:spMk id="4" creationId="{776DC2C5-FABF-AF4B-A76F-146A1F441CF0}"/>
-          </ac:spMkLst>
-        </pc:spChg>
-        <pc:spChg chg="mod">
-          <ac:chgData name="Marcia Moraes" userId="c9c67e8a-58e2-4733-9a1c-5d44fec4775b" providerId="ADAL" clId="{D79FB4EA-AD9E-48DA-9A09-B5201FDCFA77}" dt="2023-03-23T19:54:43.331" v="554" actId="1076"/>
-          <ac:spMkLst>
-            <pc:docMk/>
-            <pc:sldMk cId="2465426233" sldId="258"/>
-            <ac:spMk id="5" creationId="{C3D6DE1E-C72D-FC4D-AD95-9E372E55E0AA}"/>
-          </ac:spMkLst>
-        </pc:spChg>
-        <pc:spChg chg="mod">
-          <ac:chgData name="Marcia Moraes" userId="c9c67e8a-58e2-4733-9a1c-5d44fec4775b" providerId="ADAL" clId="{D79FB4EA-AD9E-48DA-9A09-B5201FDCFA77}" dt="2023-03-23T19:54:28.955" v="551" actId="1076"/>
-          <ac:spMkLst>
-            <pc:docMk/>
-            <pc:sldMk cId="2465426233" sldId="258"/>
-            <ac:spMk id="7" creationId="{1D54C574-F1C4-224F-8D72-1D0CE315659A}"/>
-          </ac:spMkLst>
-        </pc:spChg>
-        <pc:spChg chg="mod">
-          <ac:chgData name="Marcia Moraes" userId="c9c67e8a-58e2-4733-9a1c-5d44fec4775b" providerId="ADAL" clId="{D79FB4EA-AD9E-48DA-9A09-B5201FDCFA77}" dt="2023-03-23T19:54:38.222" v="553" actId="1076"/>
-          <ac:spMkLst>
-            <pc:docMk/>
-            <pc:sldMk cId="2465426233" sldId="258"/>
-            <ac:spMk id="8" creationId="{EDB37B83-B729-414D-BB64-25ADD03C6C95}"/>
-          </ac:spMkLst>
-        </pc:spChg>
-        <pc:spChg chg="del mod">
-          <ac:chgData name="Marcia Moraes" userId="c9c67e8a-58e2-4733-9a1c-5d44fec4775b" providerId="ADAL" clId="{D79FB4EA-AD9E-48DA-9A09-B5201FDCFA77}" dt="2023-03-23T19:54:01.394" v="545" actId="478"/>
-          <ac:spMkLst>
-            <pc:docMk/>
-            <pc:sldMk cId="2465426233" sldId="258"/>
-            <ac:spMk id="9" creationId="{5A212008-80E3-5449-84B5-3C7398A29D87}"/>
-          </ac:spMkLst>
-        </pc:spChg>
-      </pc:sldChg>
-      <pc:sldChg chg="modSp">
-        <pc:chgData name="Marcia Moraes" userId="c9c67e8a-58e2-4733-9a1c-5d44fec4775b" providerId="ADAL" clId="{D79FB4EA-AD9E-48DA-9A09-B5201FDCFA77}" dt="2023-03-23T20:00:29.037" v="584" actId="1076"/>
-        <pc:sldMkLst>
-          <pc:docMk/>
-          <pc:sldMk cId="1014466982" sldId="259"/>
-        </pc:sldMkLst>
-        <pc:spChg chg="mod">
-          <ac:chgData name="Marcia Moraes" userId="c9c67e8a-58e2-4733-9a1c-5d44fec4775b" providerId="ADAL" clId="{D79FB4EA-AD9E-48DA-9A09-B5201FDCFA77}" dt="2023-03-23T19:59:30.433" v="578" actId="1076"/>
-          <ac:spMkLst>
-            <pc:docMk/>
-            <pc:sldMk cId="1014466982" sldId="259"/>
-            <ac:spMk id="2" creationId="{2DBAED83-8A0A-0548-BA23-13CB5D45BC8F}"/>
-          </ac:spMkLst>
-        </pc:spChg>
-        <pc:spChg chg="mod">
-          <ac:chgData name="Marcia Moraes" userId="c9c67e8a-58e2-4733-9a1c-5d44fec4775b" providerId="ADAL" clId="{D79FB4EA-AD9E-48DA-9A09-B5201FDCFA77}" dt="2023-03-23T19:59:41.391" v="580" actId="20577"/>
-          <ac:spMkLst>
-            <pc:docMk/>
-            <pc:sldMk cId="1014466982" sldId="259"/>
-            <ac:spMk id="3" creationId="{507F2138-38CE-FB4F-963C-1AF7D9CA4471}"/>
-          </ac:spMkLst>
-        </pc:spChg>
-        <pc:spChg chg="mod">
-          <ac:chgData name="Marcia Moraes" userId="c9c67e8a-58e2-4733-9a1c-5d44fec4775b" providerId="ADAL" clId="{D79FB4EA-AD9E-48DA-9A09-B5201FDCFA77}" dt="2023-03-23T20:00:20.392" v="582" actId="14100"/>
-          <ac:spMkLst>
-            <pc:docMk/>
-            <pc:sldMk cId="1014466982" sldId="259"/>
-            <ac:spMk id="4" creationId="{BE278577-C507-B448-9A94-C13AB472D32E}"/>
-          </ac:spMkLst>
-        </pc:spChg>
-        <pc:inkChg chg="mod">
-          <ac:chgData name="Marcia Moraes" userId="c9c67e8a-58e2-4733-9a1c-5d44fec4775b" providerId="ADAL" clId="{D79FB4EA-AD9E-48DA-9A09-B5201FDCFA77}" dt="2023-03-23T20:00:22.940" v="583" actId="1076"/>
-          <ac:inkMkLst>
-            <pc:docMk/>
-            <pc:sldMk cId="1014466982" sldId="259"/>
-            <ac:inkMk id="5" creationId="{47034581-2088-48CB-B05C-0CDD05B94136}"/>
-          </ac:inkMkLst>
-        </pc:inkChg>
-        <pc:inkChg chg="mod">
-          <ac:chgData name="Marcia Moraes" userId="c9c67e8a-58e2-4733-9a1c-5d44fec4775b" providerId="ADAL" clId="{D79FB4EA-AD9E-48DA-9A09-B5201FDCFA77}" dt="2023-03-23T20:00:29.037" v="584" actId="1076"/>
-          <ac:inkMkLst>
-            <pc:docMk/>
-            <pc:sldMk cId="1014466982" sldId="259"/>
-            <ac:inkMk id="6" creationId="{63D7F7F9-8B58-453C-A6FD-416D34544E16}"/>
-          </ac:inkMkLst>
-        </pc:inkChg>
-      </pc:sldChg>
-      <pc:sldChg chg="addSp delSp modSp">
-        <pc:chgData name="Marcia Moraes" userId="c9c67e8a-58e2-4733-9a1c-5d44fec4775b" providerId="ADAL" clId="{D79FB4EA-AD9E-48DA-9A09-B5201FDCFA77}" dt="2023-03-23T19:40:07.729" v="475" actId="1076"/>
-        <pc:sldMkLst>
-          <pc:docMk/>
-          <pc:sldMk cId="2451232438" sldId="260"/>
-        </pc:sldMkLst>
-        <pc:spChg chg="mod">
-          <ac:chgData name="Marcia Moraes" userId="c9c67e8a-58e2-4733-9a1c-5d44fec4775b" providerId="ADAL" clId="{D79FB4EA-AD9E-48DA-9A09-B5201FDCFA77}" dt="2023-03-23T19:40:07.729" v="475" actId="1076"/>
-          <ac:spMkLst>
-            <pc:docMk/>
-            <pc:sldMk cId="2451232438" sldId="260"/>
-            <ac:spMk id="4" creationId="{F6F7E663-32CE-E448-95F9-79C015848441}"/>
-          </ac:spMkLst>
-        </pc:spChg>
-        <pc:spChg chg="add del mod">
-          <ac:chgData name="Marcia Moraes" userId="c9c67e8a-58e2-4733-9a1c-5d44fec4775b" providerId="ADAL" clId="{D79FB4EA-AD9E-48DA-9A09-B5201FDCFA77}" dt="2023-03-23T19:32:24.240" v="442" actId="6549"/>
-          <ac:spMkLst>
-            <pc:docMk/>
-            <pc:sldMk cId="2451232438" sldId="260"/>
-            <ac:spMk id="5" creationId="{F3430565-9E8F-1349-833D-D81F25510834}"/>
-          </ac:spMkLst>
-        </pc:spChg>
-        <pc:spChg chg="mod">
-          <ac:chgData name="Marcia Moraes" userId="c9c67e8a-58e2-4733-9a1c-5d44fec4775b" providerId="ADAL" clId="{D79FB4EA-AD9E-48DA-9A09-B5201FDCFA77}" dt="2023-03-23T19:32:17.978" v="441" actId="20577"/>
-          <ac:spMkLst>
-            <pc:docMk/>
-            <pc:sldMk cId="2451232438" sldId="260"/>
-            <ac:spMk id="6" creationId="{070BA3BB-E4AC-1442-9C1B-434DA00352F6}"/>
-          </ac:spMkLst>
-        </pc:spChg>
-      </pc:sldChg>
-      <pc:sldChg chg="addSp delSp modSp">
-        <pc:chgData name="Marcia Moraes" userId="c9c67e8a-58e2-4733-9a1c-5d44fec4775b" providerId="ADAL" clId="{D79FB4EA-AD9E-48DA-9A09-B5201FDCFA77}" dt="2023-03-23T19:40:02.952" v="474" actId="1076"/>
-        <pc:sldMkLst>
-          <pc:docMk/>
-          <pc:sldMk cId="1227827217" sldId="261"/>
-        </pc:sldMkLst>
-        <pc:spChg chg="mod">
-          <ac:chgData name="Marcia Moraes" userId="c9c67e8a-58e2-4733-9a1c-5d44fec4775b" providerId="ADAL" clId="{D79FB4EA-AD9E-48DA-9A09-B5201FDCFA77}" dt="2023-03-23T19:40:02.952" v="474" actId="1076"/>
-          <ac:spMkLst>
-            <pc:docMk/>
-            <pc:sldMk cId="1227827217" sldId="261"/>
-            <ac:spMk id="4" creationId="{F6F7E663-32CE-E448-95F9-79C015848441}"/>
-          </ac:spMkLst>
-        </pc:spChg>
-        <pc:spChg chg="del">
-          <ac:chgData name="Marcia Moraes" userId="c9c67e8a-58e2-4733-9a1c-5d44fec4775b" providerId="ADAL" clId="{D79FB4EA-AD9E-48DA-9A09-B5201FDCFA77}" dt="2023-03-23T19:36:25.571" v="444" actId="478"/>
-          <ac:spMkLst>
-            <pc:docMk/>
-            <pc:sldMk cId="1227827217" sldId="261"/>
-            <ac:spMk id="5" creationId="{F3430565-9E8F-1349-833D-D81F25510834}"/>
-          </ac:spMkLst>
-        </pc:spChg>
-        <pc:spChg chg="mod">
-          <ac:chgData name="Marcia Moraes" userId="c9c67e8a-58e2-4733-9a1c-5d44fec4775b" providerId="ADAL" clId="{D79FB4EA-AD9E-48DA-9A09-B5201FDCFA77}" dt="2023-03-23T19:39:45.175" v="471" actId="14100"/>
-          <ac:spMkLst>
-            <pc:docMk/>
-            <pc:sldMk cId="1227827217" sldId="261"/>
-            <ac:spMk id="6" creationId="{070BA3BB-E4AC-1442-9C1B-434DA00352F6}"/>
-          </ac:spMkLst>
-        </pc:spChg>
-        <pc:spChg chg="add mod">
-          <ac:chgData name="Marcia Moraes" userId="c9c67e8a-58e2-4733-9a1c-5d44fec4775b" providerId="ADAL" clId="{D79FB4EA-AD9E-48DA-9A09-B5201FDCFA77}" dt="2023-03-23T19:39:58.418" v="473" actId="14100"/>
-          <ac:spMkLst>
-            <pc:docMk/>
-            <pc:sldMk cId="1227827217" sldId="261"/>
-            <ac:spMk id="7" creationId="{95A40B67-1CA5-4F37-9FD6-8058A256357E}"/>
-          </ac:spMkLst>
-        </pc:spChg>
-      </pc:sldChg>
-      <pc:sldChg chg="addSp delSp modSp ord delAnim">
-        <pc:chgData name="Marcia Moraes" userId="c9c67e8a-58e2-4733-9a1c-5d44fec4775b" providerId="ADAL" clId="{D79FB4EA-AD9E-48DA-9A09-B5201FDCFA77}" dt="2023-03-23T22:29:14.903" v="618"/>
-        <pc:sldMkLst>
-          <pc:docMk/>
-          <pc:sldMk cId="2110323143" sldId="262"/>
-        </pc:sldMkLst>
-        <pc:spChg chg="mod">
-          <ac:chgData name="Marcia Moraes" userId="c9c67e8a-58e2-4733-9a1c-5d44fec4775b" providerId="ADAL" clId="{D79FB4EA-AD9E-48DA-9A09-B5201FDCFA77}" dt="2023-03-23T19:40:51.370" v="478" actId="1076"/>
-          <ac:spMkLst>
-            <pc:docMk/>
-            <pc:sldMk cId="2110323143" sldId="262"/>
-            <ac:spMk id="2" creationId="{2DBAED83-8A0A-0548-BA23-13CB5D45BC8F}"/>
-          </ac:spMkLst>
-        </pc:spChg>
-        <pc:spChg chg="mod">
-          <ac:chgData name="Marcia Moraes" userId="c9c67e8a-58e2-4733-9a1c-5d44fec4775b" providerId="ADAL" clId="{D79FB4EA-AD9E-48DA-9A09-B5201FDCFA77}" dt="2023-03-23T19:50:30.750" v="531" actId="1076"/>
-          <ac:spMkLst>
-            <pc:docMk/>
-            <pc:sldMk cId="2110323143" sldId="262"/>
-            <ac:spMk id="3" creationId="{507F2138-38CE-FB4F-963C-1AF7D9CA4471}"/>
-          </ac:spMkLst>
-        </pc:spChg>
-        <pc:spChg chg="add del mod">
-          <ac:chgData name="Marcia Moraes" userId="c9c67e8a-58e2-4733-9a1c-5d44fec4775b" providerId="ADAL" clId="{D79FB4EA-AD9E-48DA-9A09-B5201FDCFA77}" dt="2023-03-23T19:55:28.428" v="574" actId="20577"/>
-          <ac:spMkLst>
-            <pc:docMk/>
-            <pc:sldMk cId="2110323143" sldId="262"/>
-            <ac:spMk id="4" creationId="{BE278577-C507-B448-9A94-C13AB472D32E}"/>
-          </ac:spMkLst>
-        </pc:spChg>
-        <pc:spChg chg="del">
-          <ac:chgData name="Marcia Moraes" userId="c9c67e8a-58e2-4733-9a1c-5d44fec4775b" providerId="ADAL" clId="{D79FB4EA-AD9E-48DA-9A09-B5201FDCFA77}" dt="2023-03-23T19:40:34.149" v="477" actId="478"/>
-          <ac:spMkLst>
-            <pc:docMk/>
-            <pc:sldMk cId="2110323143" sldId="262"/>
-            <ac:spMk id="5" creationId="{0B6DB505-B293-476A-97B8-E110A9BCA353}"/>
-          </ac:spMkLst>
-        </pc:spChg>
-        <pc:spChg chg="add del">
-          <ac:chgData name="Marcia Moraes" userId="c9c67e8a-58e2-4733-9a1c-5d44fec4775b" providerId="ADAL" clId="{D79FB4EA-AD9E-48DA-9A09-B5201FDCFA77}" dt="2023-03-23T19:49:28.119" v="488" actId="478"/>
-          <ac:spMkLst>
-            <pc:docMk/>
-            <pc:sldMk cId="2110323143" sldId="262"/>
-            <ac:spMk id="6" creationId="{EAA3CC2B-5963-4EA7-9980-E49BB3E96A50}"/>
-          </ac:spMkLst>
-        </pc:spChg>
-      </pc:sldChg>
-      <pc:sldChg chg="del">
-        <pc:chgData name="Marcia Moraes" userId="c9c67e8a-58e2-4733-9a1c-5d44fec4775b" providerId="ADAL" clId="{D79FB4EA-AD9E-48DA-9A09-B5201FDCFA77}" dt="2023-03-23T19:58:39.627" v="575" actId="2696"/>
-        <pc:sldMkLst>
-          <pc:docMk/>
-          <pc:sldMk cId="1730857530" sldId="263"/>
-        </pc:sldMkLst>
-      </pc:sldChg>
-      <pc:sldChg chg="modSp">
-        <pc:chgData name="Marcia Moraes" userId="c9c67e8a-58e2-4733-9a1c-5d44fec4775b" providerId="ADAL" clId="{D79FB4EA-AD9E-48DA-9A09-B5201FDCFA77}" dt="2023-03-23T20:01:28.938" v="612" actId="6549"/>
-        <pc:sldMkLst>
-          <pc:docMk/>
-          <pc:sldMk cId="1439199420" sldId="264"/>
-        </pc:sldMkLst>
-        <pc:spChg chg="mod">
-          <ac:chgData name="Marcia Moraes" userId="c9c67e8a-58e2-4733-9a1c-5d44fec4775b" providerId="ADAL" clId="{D79FB4EA-AD9E-48DA-9A09-B5201FDCFA77}" dt="2023-03-23T20:00:40.014" v="586" actId="20577"/>
-          <ac:spMkLst>
-            <pc:docMk/>
-            <pc:sldMk cId="1439199420" sldId="264"/>
-            <ac:spMk id="2" creationId="{2DBAED83-8A0A-0548-BA23-13CB5D45BC8F}"/>
-          </ac:spMkLst>
-        </pc:spChg>
-        <pc:spChg chg="mod">
-          <ac:chgData name="Marcia Moraes" userId="c9c67e8a-58e2-4733-9a1c-5d44fec4775b" providerId="ADAL" clId="{D79FB4EA-AD9E-48DA-9A09-B5201FDCFA77}" dt="2023-03-23T20:00:51.044" v="587" actId="255"/>
-          <ac:spMkLst>
-            <pc:docMk/>
-            <pc:sldMk cId="1439199420" sldId="264"/>
-            <ac:spMk id="3" creationId="{507F2138-38CE-FB4F-963C-1AF7D9CA4471}"/>
-          </ac:spMkLst>
-        </pc:spChg>
-        <pc:spChg chg="mod">
-          <ac:chgData name="Marcia Moraes" userId="c9c67e8a-58e2-4733-9a1c-5d44fec4775b" providerId="ADAL" clId="{D79FB4EA-AD9E-48DA-9A09-B5201FDCFA77}" dt="2023-03-23T20:01:28.938" v="612" actId="6549"/>
-          <ac:spMkLst>
-            <pc:docMk/>
-            <pc:sldMk cId="1439199420" sldId="264"/>
-            <ac:spMk id="4" creationId="{BE278577-C507-B448-9A94-C13AB472D32E}"/>
-          </ac:spMkLst>
-        </pc:spChg>
-      </pc:sldChg>
-      <pc:sldChg chg="addSp del">
-        <pc:chgData name="Marcia Moraes" userId="c9c67e8a-58e2-4733-9a1c-5d44fec4775b" providerId="ADAL" clId="{D79FB4EA-AD9E-48DA-9A09-B5201FDCFA77}" dt="2023-03-23T22:29:06.523" v="616" actId="2696"/>
-        <pc:sldMkLst>
-          <pc:docMk/>
-          <pc:sldMk cId="2955887086" sldId="265"/>
-        </pc:sldMkLst>
-        <pc:spChg chg="add">
-          <ac:chgData name="Marcia Moraes" userId="c9c67e8a-58e2-4733-9a1c-5d44fec4775b" providerId="ADAL" clId="{D79FB4EA-AD9E-48DA-9A09-B5201FDCFA77}" dt="2023-03-23T20:02:52.683" v="615"/>
-          <ac:spMkLst>
-            <pc:docMk/>
-            <pc:sldMk cId="2955887086" sldId="265"/>
-            <ac:spMk id="5" creationId="{289AEF32-1998-432B-BC53-B9CE3EA13433}"/>
-          </ac:spMkLst>
-        </pc:spChg>
-      </pc:sldChg>
-      <pc:sldChg chg="del">
-        <pc:chgData name="Marcia Moraes" userId="c9c67e8a-58e2-4733-9a1c-5d44fec4775b" providerId="ADAL" clId="{D79FB4EA-AD9E-48DA-9A09-B5201FDCFA77}" dt="2023-03-23T16:58:51.235" v="188" actId="2696"/>
-        <pc:sldMkLst>
-          <pc:docMk/>
-          <pc:sldMk cId="926474781" sldId="267"/>
-        </pc:sldMkLst>
-      </pc:sldChg>
-      <pc:sldChg chg="del">
-        <pc:chgData name="Marcia Moraes" userId="c9c67e8a-58e2-4733-9a1c-5d44fec4775b" providerId="ADAL" clId="{D79FB4EA-AD9E-48DA-9A09-B5201FDCFA77}" dt="2023-03-23T20:02:50.203" v="614" actId="2696"/>
-        <pc:sldMkLst>
-          <pc:docMk/>
-          <pc:sldMk cId="0" sldId="269"/>
-        </pc:sldMkLst>
-      </pc:sldChg>
-      <pc:sldChg chg="del">
-        <pc:chgData name="Marcia Moraes" userId="c9c67e8a-58e2-4733-9a1c-5d44fec4775b" providerId="ADAL" clId="{D79FB4EA-AD9E-48DA-9A09-B5201FDCFA77}" dt="2023-03-23T20:02:23.498" v="613" actId="2696"/>
-        <pc:sldMkLst>
-          <pc:docMk/>
-          <pc:sldMk cId="1453778164" sldId="270"/>
-        </pc:sldMkLst>
-      </pc:sldChg>
-      <pc:sldChg chg="addSp delSp modSp add">
-        <pc:chgData name="Marcia Moraes" userId="c9c67e8a-58e2-4733-9a1c-5d44fec4775b" providerId="ADAL" clId="{D79FB4EA-AD9E-48DA-9A09-B5201FDCFA77}" dt="2023-03-23T16:55:37.934" v="187" actId="1076"/>
+        <pc:chgData name="Marcia Moraes" userId="c9c67e8a-58e2-4733-9a1c-5d44fec4775b" providerId="ADAL" clId="{CA673059-942D-4FC2-B7DB-95A394EB4144}" dt="2023-10-11T00:49:38.468" v="2" actId="1076"/>
         <pc:sldMkLst>
           <pc:docMk/>
           <pc:sldMk cId="2571368551" sldId="272"/>
         </pc:sldMkLst>
-        <pc:spChg chg="mod">
-          <ac:chgData name="Marcia Moraes" userId="c9c67e8a-58e2-4733-9a1c-5d44fec4775b" providerId="ADAL" clId="{D79FB4EA-AD9E-48DA-9A09-B5201FDCFA77}" dt="2023-03-23T16:50:58.126" v="7" actId="1076"/>
-          <ac:spMkLst>
-            <pc:docMk/>
-            <pc:sldMk cId="2571368551" sldId="272"/>
-            <ac:spMk id="2" creationId="{84CD52E7-9878-46B0-B322-12FDC9581986}"/>
-          </ac:spMkLst>
-        </pc:spChg>
-        <pc:spChg chg="add mod">
-          <ac:chgData name="Marcia Moraes" userId="c9c67e8a-58e2-4733-9a1c-5d44fec4775b" providerId="ADAL" clId="{D79FB4EA-AD9E-48DA-9A09-B5201FDCFA77}" dt="2023-03-23T16:55:37.934" v="187" actId="1076"/>
+        <pc:spChg chg="del">
+          <ac:chgData name="Marcia Moraes" userId="c9c67e8a-58e2-4733-9a1c-5d44fec4775b" providerId="ADAL" clId="{CA673059-942D-4FC2-B7DB-95A394EB4144}" dt="2023-10-11T00:49:31.607" v="0" actId="478"/>
           <ac:spMkLst>
             <pc:docMk/>
             <pc:sldMk cId="2571368551" sldId="272"/>
             <ac:spMk id="5" creationId="{1E54CBCD-3447-4F03-970A-F1628F46BEF2}"/>
           </ac:spMkLst>
         </pc:spChg>
-        <pc:spChg chg="mod">
-          <ac:chgData name="Marcia Moraes" userId="c9c67e8a-58e2-4733-9a1c-5d44fec4775b" providerId="ADAL" clId="{D79FB4EA-AD9E-48DA-9A09-B5201FDCFA77}" dt="2023-03-23T16:51:15.955" v="11" actId="6549"/>
+        <pc:spChg chg="add mod">
+          <ac:chgData name="Marcia Moraes" userId="c9c67e8a-58e2-4733-9a1c-5d44fec4775b" providerId="ADAL" clId="{CA673059-942D-4FC2-B7DB-95A394EB4144}" dt="2023-10-11T00:49:38.468" v="2" actId="1076"/>
           <ac:spMkLst>
             <pc:docMk/>
             <pc:sldMk cId="2571368551" sldId="272"/>
-            <ac:spMk id="11" creationId="{BDA0DBC1-29A7-4498-B9AA-9B174D0FEC3E}"/>
+            <ac:spMk id="7" creationId="{3533720F-4B76-430B-AB26-69D7FE91CB57}"/>
           </ac:spMkLst>
         </pc:spChg>
-        <pc:picChg chg="add mod">
-          <ac:chgData name="Marcia Moraes" userId="c9c67e8a-58e2-4733-9a1c-5d44fec4775b" providerId="ADAL" clId="{D79FB4EA-AD9E-48DA-9A09-B5201FDCFA77}" dt="2023-03-23T16:50:31.851" v="5" actId="1076"/>
-          <ac:picMkLst>
+        <pc:graphicFrameChg chg="add mod">
+          <ac:chgData name="Marcia Moraes" userId="c9c67e8a-58e2-4733-9a1c-5d44fec4775b" providerId="ADAL" clId="{CA673059-942D-4FC2-B7DB-95A394EB4144}" dt="2023-10-11T00:49:38.468" v="2" actId="1076"/>
+          <ac:graphicFrameMkLst>
             <pc:docMk/>
             <pc:sldMk cId="2571368551" sldId="272"/>
-            <ac:picMk id="3" creationId="{56004AA4-ADC7-47C2-A641-282FB8A9D64E}"/>
-          </ac:picMkLst>
-        </pc:picChg>
-        <pc:picChg chg="del">
-          <ac:chgData name="Marcia Moraes" userId="c9c67e8a-58e2-4733-9a1c-5d44fec4775b" providerId="ADAL" clId="{D79FB4EA-AD9E-48DA-9A09-B5201FDCFA77}" dt="2023-03-23T16:50:20.484" v="1" actId="478"/>
-          <ac:picMkLst>
-            <pc:docMk/>
-            <pc:sldMk cId="2571368551" sldId="272"/>
-            <ac:picMk id="1026" creationId="{FAA94CC7-39DC-490E-87D2-27F1157EAB7B}"/>
-          </ac:picMkLst>
-        </pc:picChg>
+            <ac:graphicFrameMk id="8" creationId="{509E16E6-A1F0-4ED2-AF4E-30E3C3A24B46}"/>
+          </ac:graphicFrameMkLst>
+        </pc:graphicFrameChg>
       </pc:sldChg>
-      <pc:sldChg chg="addSp delSp modSp add">
-        <pc:chgData name="Marcia Moraes" userId="c9c67e8a-58e2-4733-9a1c-5d44fec4775b" providerId="ADAL" clId="{D79FB4EA-AD9E-48DA-9A09-B5201FDCFA77}" dt="2023-03-23T22:45:11.402" v="846" actId="20577"/>
-        <pc:sldMkLst>
-          <pc:docMk/>
-          <pc:sldMk cId="1583649201" sldId="273"/>
-        </pc:sldMkLst>
-        <pc:spChg chg="mod">
-          <ac:chgData name="Marcia Moraes" userId="c9c67e8a-58e2-4733-9a1c-5d44fec4775b" providerId="ADAL" clId="{D79FB4EA-AD9E-48DA-9A09-B5201FDCFA77}" dt="2023-03-23T22:39:07.945" v="627" actId="20577"/>
-          <ac:spMkLst>
-            <pc:docMk/>
-            <pc:sldMk cId="1583649201" sldId="273"/>
-            <ac:spMk id="2" creationId="{2DBAED83-8A0A-0548-BA23-13CB5D45BC8F}"/>
-          </ac:spMkLst>
-        </pc:spChg>
-        <pc:spChg chg="mod">
-          <ac:chgData name="Marcia Moraes" userId="c9c67e8a-58e2-4733-9a1c-5d44fec4775b" providerId="ADAL" clId="{D79FB4EA-AD9E-48DA-9A09-B5201FDCFA77}" dt="2023-03-23T22:45:11.402" v="846" actId="20577"/>
-          <ac:spMkLst>
-            <pc:docMk/>
-            <pc:sldMk cId="1583649201" sldId="273"/>
-            <ac:spMk id="3" creationId="{507F2138-38CE-FB4F-963C-1AF7D9CA4471}"/>
-          </ac:spMkLst>
-        </pc:spChg>
-        <pc:spChg chg="del">
-          <ac:chgData name="Marcia Moraes" userId="c9c67e8a-58e2-4733-9a1c-5d44fec4775b" providerId="ADAL" clId="{D79FB4EA-AD9E-48DA-9A09-B5201FDCFA77}" dt="2023-03-23T22:40:07.190" v="631" actId="478"/>
-          <ac:spMkLst>
-            <pc:docMk/>
-            <pc:sldMk cId="1583649201" sldId="273"/>
-            <ac:spMk id="4" creationId="{BE278577-C507-B448-9A94-C13AB472D32E}"/>
-          </ac:spMkLst>
-        </pc:spChg>
-        <pc:picChg chg="add mod">
-          <ac:chgData name="Marcia Moraes" userId="c9c67e8a-58e2-4733-9a1c-5d44fec4775b" providerId="ADAL" clId="{D79FB4EA-AD9E-48DA-9A09-B5201FDCFA77}" dt="2023-03-23T22:44:31.475" v="780" actId="1076"/>
-          <ac:picMkLst>
-            <pc:docMk/>
-            <pc:sldMk cId="1583649201" sldId="273"/>
-            <ac:picMk id="5" creationId="{6A60AAB6-55CF-4B44-9C08-E345A9012F4E}"/>
-          </ac:picMkLst>
-        </pc:picChg>
-      </pc:sldChg>
-      <pc:sldChg chg="delSp modSp add">
-        <pc:chgData name="Marcia Moraes" userId="c9c67e8a-58e2-4733-9a1c-5d44fec4775b" providerId="ADAL" clId="{D79FB4EA-AD9E-48DA-9A09-B5201FDCFA77}" dt="2023-03-23T22:51:05.183" v="919" actId="20577"/>
-        <pc:sldMkLst>
-          <pc:docMk/>
-          <pc:sldMk cId="807556313" sldId="274"/>
-        </pc:sldMkLst>
-        <pc:spChg chg="mod">
-          <ac:chgData name="Marcia Moraes" userId="c9c67e8a-58e2-4733-9a1c-5d44fec4775b" providerId="ADAL" clId="{D79FB4EA-AD9E-48DA-9A09-B5201FDCFA77}" dt="2023-03-23T22:46:17.709" v="859" actId="20577"/>
-          <ac:spMkLst>
-            <pc:docMk/>
-            <pc:sldMk cId="807556313" sldId="274"/>
-            <ac:spMk id="2" creationId="{2DBAED83-8A0A-0548-BA23-13CB5D45BC8F}"/>
-          </ac:spMkLst>
-        </pc:spChg>
-        <pc:spChg chg="mod">
-          <ac:chgData name="Marcia Moraes" userId="c9c67e8a-58e2-4733-9a1c-5d44fec4775b" providerId="ADAL" clId="{D79FB4EA-AD9E-48DA-9A09-B5201FDCFA77}" dt="2023-03-23T22:51:05.183" v="919" actId="20577"/>
-          <ac:spMkLst>
-            <pc:docMk/>
-            <pc:sldMk cId="807556313" sldId="274"/>
-            <ac:spMk id="3" creationId="{507F2138-38CE-FB4F-963C-1AF7D9CA4471}"/>
-          </ac:spMkLst>
-        </pc:spChg>
-        <pc:picChg chg="del">
-          <ac:chgData name="Marcia Moraes" userId="c9c67e8a-58e2-4733-9a1c-5d44fec4775b" providerId="ADAL" clId="{D79FB4EA-AD9E-48DA-9A09-B5201FDCFA77}" dt="2023-03-23T22:48:07.953" v="864" actId="478"/>
-          <ac:picMkLst>
-            <pc:docMk/>
-            <pc:sldMk cId="807556313" sldId="274"/>
-            <ac:picMk id="5" creationId="{6A60AAB6-55CF-4B44-9C08-E345A9012F4E}"/>
-          </ac:picMkLst>
-        </pc:picChg>
-      </pc:sldChg>
-      <pc:sldMasterChg chg="modSldLayout">
-        <pc:chgData name="Marcia Moraes" userId="c9c67e8a-58e2-4733-9a1c-5d44fec4775b" providerId="ADAL" clId="{D79FB4EA-AD9E-48DA-9A09-B5201FDCFA77}" dt="2023-03-23T18:04:37.852" v="351" actId="20577"/>
-        <pc:sldMasterMkLst>
-          <pc:docMk/>
-          <pc:sldMasterMk cId="3965733437" sldId="2147483648"/>
-        </pc:sldMasterMkLst>
-        <pc:sldLayoutChg chg="modSp">
-          <pc:chgData name="Marcia Moraes" userId="c9c67e8a-58e2-4733-9a1c-5d44fec4775b" providerId="ADAL" clId="{D79FB4EA-AD9E-48DA-9A09-B5201FDCFA77}" dt="2023-03-23T18:04:37.852" v="351" actId="20577"/>
-          <pc:sldLayoutMkLst>
-            <pc:docMk/>
-            <pc:sldMasterMk cId="3965733437" sldId="2147483648"/>
-            <pc:sldLayoutMk cId="0" sldId="2147483689"/>
-          </pc:sldLayoutMkLst>
-          <pc:spChg chg="mod">
-            <ac:chgData name="Marcia Moraes" userId="c9c67e8a-58e2-4733-9a1c-5d44fec4775b" providerId="ADAL" clId="{D79FB4EA-AD9E-48DA-9A09-B5201FDCFA77}" dt="2023-03-23T18:04:07.409" v="289" actId="1076"/>
-            <ac:spMkLst>
-              <pc:docMk/>
-              <pc:sldMasterMk cId="3965733437" sldId="2147483648"/>
-              <pc:sldLayoutMk cId="0" sldId="2147483689"/>
-              <ac:spMk id="9" creationId="{518974DB-51D0-2C49-9088-48CE2D84AB1C}"/>
-            </ac:spMkLst>
-          </pc:spChg>
-          <pc:spChg chg="mod">
-            <ac:chgData name="Marcia Moraes" userId="c9c67e8a-58e2-4733-9a1c-5d44fec4775b" providerId="ADAL" clId="{D79FB4EA-AD9E-48DA-9A09-B5201FDCFA77}" dt="2023-03-23T18:04:37.852" v="351" actId="20577"/>
-            <ac:spMkLst>
-              <pc:docMk/>
-              <pc:sldMasterMk cId="3965733437" sldId="2147483648"/>
-              <pc:sldLayoutMk cId="0" sldId="2147483689"/>
-              <ac:spMk id="11" creationId="{F621E987-BD36-AF48-B11C-CC4BAD65092F}"/>
-            </ac:spMkLst>
-          </pc:spChg>
-          <pc:picChg chg="mod">
-            <ac:chgData name="Marcia Moraes" userId="c9c67e8a-58e2-4733-9a1c-5d44fec4775b" providerId="ADAL" clId="{D79FB4EA-AD9E-48DA-9A09-B5201FDCFA77}" dt="2023-03-23T18:04:04.703" v="288" actId="1076"/>
-            <ac:picMkLst>
-              <pc:docMk/>
-              <pc:sldMasterMk cId="3965733437" sldId="2147483648"/>
-              <pc:sldLayoutMk cId="0" sldId="2147483689"/>
-              <ac:picMk id="7" creationId="{00000000-0000-0000-0000-000000000000}"/>
-            </ac:picMkLst>
-          </pc:picChg>
-        </pc:sldLayoutChg>
-      </pc:sldMasterChg>
     </pc:docChg>
   </pc:docChgLst>
 </pc:chgInfo>
@@ -737,7 +272,7 @@
           <a:p>
             <a:fld id="{4D7E51A5-B478-1E40-8CBB-0DAA8831E99D}" type="datetimeFigureOut">
               <a:rPr lang="en-US" smtClean="0"/>
-              <a:t>3/23/2023</a:t>
+              <a:t>10/11/2023</a:t>
             </a:fld>
             <a:endParaRPr lang="en-US"/>
           </a:p>
@@ -958,7 +493,7 @@
           <a:p>
             <a:fld id="{D0ED587F-861E-6740-9643-E3DDAE89B8D6}" type="datetimeFigureOut">
               <a:rPr lang="en-US" smtClean="0"/>
-              <a:t>3/23/2023</a:t>
+              <a:t>10/11/2023</a:t>
             </a:fld>
             <a:endParaRPr lang="en-US"/>
           </a:p>
@@ -9001,10 +8536,10 @@
       </p:pic>
       <p:sp>
         <p:nvSpPr>
-          <p:cNvPr id="5" name="TextBox 4">
+          <p:cNvPr id="7" name="TextBox 6">
             <a:extLst>
               <a:ext uri="{FF2B5EF4-FFF2-40B4-BE49-F238E27FC236}">
-                <a16:creationId xmlns:a16="http://schemas.microsoft.com/office/drawing/2014/main" id="{1E54CBCD-3447-4F03-970A-F1628F46BEF2}"/>
+                <a16:creationId xmlns:a16="http://schemas.microsoft.com/office/drawing/2014/main" id="{3533720F-4B76-430B-AB26-69D7FE91CB57}"/>
               </a:ext>
             </a:extLst>
           </p:cNvPr>
@@ -9012,19 +8547,14 @@
           <p:nvPr/>
         </p:nvSpPr>
         <p:spPr>
-          <a:xfrm>
-            <a:off x="10736342" y="3717191"/>
-            <a:ext cx="2903457" cy="3477875"/>
+          <a:xfrm flipH="1">
+            <a:off x="9987253" y="3663647"/>
+            <a:ext cx="2444933" cy="400110"/>
           </a:xfrm>
           <a:prstGeom prst="rect">
             <a:avLst/>
           </a:prstGeom>
-          <a:solidFill>
-            <a:schemeClr val="bg2">
-              <a:lumMod val="40000"/>
-              <a:lumOff val="60000"/>
-            </a:schemeClr>
-          </a:solidFill>
+          <a:noFill/>
         </p:spPr>
         <p:txBody>
           <a:bodyPr wrap="square" rtlCol="0">
@@ -9034,62 +8564,1409 @@
           <a:p>
             <a:r>
               <a:rPr lang="en-US" dirty="0"/>
-              <a:t>Friday Help Desk – </a:t>
-            </a:r>
-          </a:p>
-          <a:p>
-            <a:r>
-              <a:rPr lang="en-US" dirty="0"/>
-              <a:t>12-4pm CSB120</a:t>
-            </a:r>
-          </a:p>
-          <a:p>
-            <a:endParaRPr lang="en-US" dirty="0"/>
-          </a:p>
-          <a:p>
-            <a:r>
-              <a:rPr lang="en-US" dirty="0"/>
-              <a:t>Friday Help Session – </a:t>
-            </a:r>
-          </a:p>
-          <a:p>
-            <a:r>
-              <a:rPr lang="en-US" dirty="0"/>
-              <a:t>1-2pm Teams</a:t>
-            </a:r>
-          </a:p>
-          <a:p>
-            <a:endParaRPr lang="en-US" dirty="0"/>
-          </a:p>
-          <a:p>
-            <a:r>
-              <a:rPr lang="en-US" dirty="0"/>
-              <a:t>Saturday Help Desk – </a:t>
-            </a:r>
-          </a:p>
-          <a:p>
-            <a:r>
-              <a:rPr lang="en-US" dirty="0"/>
-              <a:t>12-4pm Teams</a:t>
-            </a:r>
-          </a:p>
-          <a:p>
-            <a:endParaRPr lang="en-US" dirty="0"/>
-          </a:p>
-          <a:p>
-            <a:r>
-              <a:rPr lang="en-US" dirty="0"/>
-              <a:t>Sunday Help Desk –</a:t>
-            </a:r>
-          </a:p>
-          <a:p>
-            <a:r>
-              <a:rPr lang="en-US" dirty="0"/>
-              <a:t>3-7pm Teams </a:t>
+              <a:t>Help Desk</a:t>
             </a:r>
           </a:p>
         </p:txBody>
       </p:sp>
+      <p:graphicFrame>
+        <p:nvGraphicFramePr>
+          <p:cNvPr id="8" name="Table 7">
+            <a:extLst>
+              <a:ext uri="{FF2B5EF4-FFF2-40B4-BE49-F238E27FC236}">
+                <a16:creationId xmlns:a16="http://schemas.microsoft.com/office/drawing/2014/main" id="{509E16E6-A1F0-4ED2-AF4E-30E3C3A24B46}"/>
+              </a:ext>
+            </a:extLst>
+          </p:cNvPr>
+          <p:cNvGraphicFramePr>
+            <a:graphicFrameLocks noGrp="1"/>
+          </p:cNvGraphicFramePr>
+          <p:nvPr>
+            <p:extLst>
+              <p:ext uri="{D42A27DB-BD31-4B8C-83A1-F6EECF244321}">
+                <p14:modId xmlns:p14="http://schemas.microsoft.com/office/powerpoint/2010/main" val="1038366294"/>
+              </p:ext>
+            </p:extLst>
+          </p:nvPr>
+        </p:nvGraphicFramePr>
+        <p:xfrm>
+          <a:off x="9998308" y="4163827"/>
+          <a:ext cx="3572199" cy="3253859"/>
+        </p:xfrm>
+        <a:graphic>
+          <a:graphicData uri="http://schemas.openxmlformats.org/drawingml/2006/table">
+            <a:tbl>
+              <a:tblPr firstRow="1">
+                <a:tableStyleId>{5C22544A-7EE6-4342-B048-85BDC9FD1C3A}</a:tableStyleId>
+              </a:tblPr>
+              <a:tblGrid>
+                <a:gridCol w="1105468">
+                  <a:extLst>
+                    <a:ext uri="{9D8B030D-6E8A-4147-A177-3AD203B41FA5}">
+                      <a16:colId xmlns:a16="http://schemas.microsoft.com/office/drawing/2014/main" val="1333462331"/>
+                    </a:ext>
+                  </a:extLst>
+                </a:gridCol>
+                <a:gridCol w="2466731">
+                  <a:extLst>
+                    <a:ext uri="{9D8B030D-6E8A-4147-A177-3AD203B41FA5}">
+                      <a16:colId xmlns:a16="http://schemas.microsoft.com/office/drawing/2014/main" val="668155110"/>
+                    </a:ext>
+                  </a:extLst>
+                </a:gridCol>
+              </a:tblGrid>
+              <a:tr h="165373">
+                <a:tc>
+                  <a:txBody>
+                    <a:bodyPr/>
+                    <a:lstStyle/>
+                    <a:p>
+                      <a:pPr marL="0" marR="0">
+                        <a:lnSpc>
+                          <a:spcPct val="107000"/>
+                        </a:lnSpc>
+                        <a:spcBef>
+                          <a:spcPts val="0"/>
+                        </a:spcBef>
+                        <a:spcAft>
+                          <a:spcPts val="800"/>
+                        </a:spcAft>
+                      </a:pPr>
+                      <a:r>
+                        <a:rPr lang="en-US" sz="1600" dirty="0">
+                          <a:solidFill>
+                            <a:schemeClr val="tx1"/>
+                          </a:solidFill>
+                          <a:effectLst/>
+                        </a:rPr>
+                        <a:t>Day</a:t>
+                      </a:r>
+                      <a:endParaRPr lang="en-US" sz="1600" dirty="0">
+                        <a:solidFill>
+                          <a:schemeClr val="tx1"/>
+                        </a:solidFill>
+                        <a:effectLst/>
+                        <a:latin typeface="Calibri" panose="020F0502020204030204" pitchFamily="34" charset="0"/>
+                        <a:ea typeface="Calibri" panose="020F0502020204030204" pitchFamily="34" charset="0"/>
+                        <a:cs typeface="Times New Roman" panose="02020603050405020304" pitchFamily="18" charset="0"/>
+                      </a:endParaRPr>
+                    </a:p>
+                  </a:txBody>
+                  <a:tcPr marL="15875" marR="15875" marT="15875" marB="15875" anchor="ctr">
+                    <a:lnL w="12700" cap="flat" cmpd="sng" algn="ctr">
+                      <a:solidFill>
+                        <a:schemeClr val="tx1"/>
+                      </a:solidFill>
+                      <a:prstDash val="solid"/>
+                      <a:round/>
+                      <a:headEnd type="none" w="med" len="med"/>
+                      <a:tailEnd type="none" w="med" len="med"/>
+                    </a:lnL>
+                    <a:lnR w="12700" cap="flat" cmpd="sng" algn="ctr">
+                      <a:solidFill>
+                        <a:schemeClr val="tx1"/>
+                      </a:solidFill>
+                      <a:prstDash val="solid"/>
+                      <a:round/>
+                      <a:headEnd type="none" w="med" len="med"/>
+                      <a:tailEnd type="none" w="med" len="med"/>
+                    </a:lnR>
+                    <a:lnT w="12700" cap="flat" cmpd="sng" algn="ctr">
+                      <a:solidFill>
+                        <a:schemeClr val="tx1"/>
+                      </a:solidFill>
+                      <a:prstDash val="solid"/>
+                      <a:round/>
+                      <a:headEnd type="none" w="med" len="med"/>
+                      <a:tailEnd type="none" w="med" len="med"/>
+                    </a:lnT>
+                    <a:lnB w="12700" cap="flat" cmpd="sng" algn="ctr">
+                      <a:solidFill>
+                        <a:schemeClr val="tx1"/>
+                      </a:solidFill>
+                      <a:prstDash val="solid"/>
+                      <a:round/>
+                      <a:headEnd type="none" w="med" len="med"/>
+                      <a:tailEnd type="none" w="med" len="med"/>
+                    </a:lnB>
+                    <a:lnTlToBr w="12700" cmpd="sng">
+                      <a:noFill/>
+                      <a:prstDash val="solid"/>
+                    </a:lnTlToBr>
+                    <a:lnBlToTr w="12700" cmpd="sng">
+                      <a:noFill/>
+                      <a:prstDash val="solid"/>
+                    </a:lnBlToTr>
+                    <a:solidFill>
+                      <a:schemeClr val="bg1"/>
+                    </a:solidFill>
+                  </a:tcPr>
+                </a:tc>
+                <a:tc>
+                  <a:txBody>
+                    <a:bodyPr/>
+                    <a:lstStyle/>
+                    <a:p>
+                      <a:pPr marL="0" marR="0">
+                        <a:lnSpc>
+                          <a:spcPct val="107000"/>
+                        </a:lnSpc>
+                        <a:spcBef>
+                          <a:spcPts val="0"/>
+                        </a:spcBef>
+                        <a:spcAft>
+                          <a:spcPts val="800"/>
+                        </a:spcAft>
+                      </a:pPr>
+                      <a:r>
+                        <a:rPr lang="en-US" sz="1600" dirty="0">
+                          <a:solidFill>
+                            <a:schemeClr val="tx1"/>
+                          </a:solidFill>
+                          <a:effectLst/>
+                        </a:rPr>
+                        <a:t>Time : Room</a:t>
+                      </a:r>
+                      <a:endParaRPr lang="en-US" sz="1600" dirty="0">
+                        <a:solidFill>
+                          <a:schemeClr val="tx1"/>
+                        </a:solidFill>
+                        <a:effectLst/>
+                        <a:latin typeface="Calibri" panose="020F0502020204030204" pitchFamily="34" charset="0"/>
+                        <a:ea typeface="Calibri" panose="020F0502020204030204" pitchFamily="34" charset="0"/>
+                        <a:cs typeface="Times New Roman" panose="02020603050405020304" pitchFamily="18" charset="0"/>
+                      </a:endParaRPr>
+                    </a:p>
+                  </a:txBody>
+                  <a:tcPr marL="15875" marR="15875" marT="15875" marB="15875" anchor="ctr">
+                    <a:lnL w="12700" cap="flat" cmpd="sng" algn="ctr">
+                      <a:solidFill>
+                        <a:schemeClr val="tx1"/>
+                      </a:solidFill>
+                      <a:prstDash val="solid"/>
+                      <a:round/>
+                      <a:headEnd type="none" w="med" len="med"/>
+                      <a:tailEnd type="none" w="med" len="med"/>
+                    </a:lnL>
+                    <a:lnR w="12700" cap="flat" cmpd="sng" algn="ctr">
+                      <a:solidFill>
+                        <a:schemeClr val="tx1"/>
+                      </a:solidFill>
+                      <a:prstDash val="solid"/>
+                      <a:round/>
+                      <a:headEnd type="none" w="med" len="med"/>
+                      <a:tailEnd type="none" w="med" len="med"/>
+                    </a:lnR>
+                    <a:lnT w="12700" cap="flat" cmpd="sng" algn="ctr">
+                      <a:solidFill>
+                        <a:schemeClr val="tx1"/>
+                      </a:solidFill>
+                      <a:prstDash val="solid"/>
+                      <a:round/>
+                      <a:headEnd type="none" w="med" len="med"/>
+                      <a:tailEnd type="none" w="med" len="med"/>
+                    </a:lnT>
+                    <a:lnB w="12700" cap="flat" cmpd="sng" algn="ctr">
+                      <a:solidFill>
+                        <a:schemeClr val="tx1"/>
+                      </a:solidFill>
+                      <a:prstDash val="solid"/>
+                      <a:round/>
+                      <a:headEnd type="none" w="med" len="med"/>
+                      <a:tailEnd type="none" w="med" len="med"/>
+                    </a:lnB>
+                    <a:lnTlToBr w="12700" cmpd="sng">
+                      <a:noFill/>
+                      <a:prstDash val="solid"/>
+                    </a:lnTlToBr>
+                    <a:lnBlToTr w="12700" cmpd="sng">
+                      <a:noFill/>
+                      <a:prstDash val="solid"/>
+                    </a:lnBlToTr>
+                    <a:solidFill>
+                      <a:schemeClr val="bg1"/>
+                    </a:solidFill>
+                  </a:tcPr>
+                </a:tc>
+                <a:extLst>
+                  <a:ext uri="{0D108BD9-81ED-4DB2-BD59-A6C34878D82A}">
+                    <a16:rowId xmlns:a16="http://schemas.microsoft.com/office/drawing/2014/main" val="3093163206"/>
+                  </a:ext>
+                </a:extLst>
+              </a:tr>
+              <a:tr h="581669">
+                <a:tc>
+                  <a:txBody>
+                    <a:bodyPr/>
+                    <a:lstStyle/>
+                    <a:p>
+                      <a:pPr marL="0" marR="0">
+                        <a:lnSpc>
+                          <a:spcPct val="107000"/>
+                        </a:lnSpc>
+                        <a:spcBef>
+                          <a:spcPts val="0"/>
+                        </a:spcBef>
+                        <a:spcAft>
+                          <a:spcPts val="800"/>
+                        </a:spcAft>
+                      </a:pPr>
+                      <a:r>
+                        <a:rPr lang="en-US" sz="1600" dirty="0">
+                          <a:effectLst/>
+                        </a:rPr>
+                        <a:t>Monday</a:t>
+                      </a:r>
+                      <a:endParaRPr lang="en-US" sz="1600" dirty="0">
+                        <a:effectLst/>
+                        <a:latin typeface="Calibri" panose="020F0502020204030204" pitchFamily="34" charset="0"/>
+                        <a:ea typeface="Calibri" panose="020F0502020204030204" pitchFamily="34" charset="0"/>
+                        <a:cs typeface="Times New Roman" panose="02020603050405020304" pitchFamily="18" charset="0"/>
+                      </a:endParaRPr>
+                    </a:p>
+                  </a:txBody>
+                  <a:tcPr marL="15875" marR="15875" marT="15875" marB="15875" anchor="ctr">
+                    <a:lnL w="12700" cap="flat" cmpd="sng" algn="ctr">
+                      <a:solidFill>
+                        <a:schemeClr val="tx1"/>
+                      </a:solidFill>
+                      <a:prstDash val="solid"/>
+                      <a:round/>
+                      <a:headEnd type="none" w="med" len="med"/>
+                      <a:tailEnd type="none" w="med" len="med"/>
+                    </a:lnL>
+                    <a:lnR w="12700" cap="flat" cmpd="sng" algn="ctr">
+                      <a:solidFill>
+                        <a:schemeClr val="tx1"/>
+                      </a:solidFill>
+                      <a:prstDash val="solid"/>
+                      <a:round/>
+                      <a:headEnd type="none" w="med" len="med"/>
+                      <a:tailEnd type="none" w="med" len="med"/>
+                    </a:lnR>
+                    <a:lnT w="12700" cap="flat" cmpd="sng" algn="ctr">
+                      <a:solidFill>
+                        <a:schemeClr val="tx1"/>
+                      </a:solidFill>
+                      <a:prstDash val="solid"/>
+                      <a:round/>
+                      <a:headEnd type="none" w="med" len="med"/>
+                      <a:tailEnd type="none" w="med" len="med"/>
+                    </a:lnT>
+                    <a:lnB w="12700" cap="flat" cmpd="sng" algn="ctr">
+                      <a:solidFill>
+                        <a:schemeClr val="tx1"/>
+                      </a:solidFill>
+                      <a:prstDash val="solid"/>
+                      <a:round/>
+                      <a:headEnd type="none" w="med" len="med"/>
+                      <a:tailEnd type="none" w="med" len="med"/>
+                    </a:lnB>
+                    <a:lnTlToBr w="12700" cmpd="sng">
+                      <a:noFill/>
+                      <a:prstDash val="solid"/>
+                    </a:lnTlToBr>
+                    <a:lnBlToTr w="12700" cmpd="sng">
+                      <a:noFill/>
+                      <a:prstDash val="solid"/>
+                    </a:lnBlToTr>
+                    <a:solidFill>
+                      <a:schemeClr val="bg1"/>
+                    </a:solidFill>
+                  </a:tcPr>
+                </a:tc>
+                <a:tc>
+                  <a:txBody>
+                    <a:bodyPr/>
+                    <a:lstStyle/>
+                    <a:p>
+                      <a:pPr marL="0" marR="0">
+                        <a:lnSpc>
+                          <a:spcPct val="107000"/>
+                        </a:lnSpc>
+                        <a:spcBef>
+                          <a:spcPts val="0"/>
+                        </a:spcBef>
+                        <a:spcAft>
+                          <a:spcPts val="800"/>
+                        </a:spcAft>
+                      </a:pPr>
+                      <a:r>
+                        <a:rPr lang="en-US" sz="1600" dirty="0">
+                          <a:effectLst/>
+                        </a:rPr>
+                        <a:t>12 PM - 2 PM : CSB 120</a:t>
+                      </a:r>
+                      <a:endParaRPr lang="en-US" sz="1600" dirty="0">
+                        <a:effectLst/>
+                        <a:latin typeface="Calibri" panose="020F0502020204030204" pitchFamily="34" charset="0"/>
+                        <a:ea typeface="Calibri" panose="020F0502020204030204" pitchFamily="34" charset="0"/>
+                        <a:cs typeface="Times New Roman" panose="02020603050405020304" pitchFamily="18" charset="0"/>
+                      </a:endParaRPr>
+                    </a:p>
+                  </a:txBody>
+                  <a:tcPr marL="15875" marR="15875" marT="15875" marB="15875" anchor="ctr">
+                    <a:lnL w="12700" cap="flat" cmpd="sng" algn="ctr">
+                      <a:solidFill>
+                        <a:schemeClr val="tx1"/>
+                      </a:solidFill>
+                      <a:prstDash val="solid"/>
+                      <a:round/>
+                      <a:headEnd type="none" w="med" len="med"/>
+                      <a:tailEnd type="none" w="med" len="med"/>
+                    </a:lnL>
+                    <a:lnR w="12700" cap="flat" cmpd="sng" algn="ctr">
+                      <a:solidFill>
+                        <a:schemeClr val="tx1"/>
+                      </a:solidFill>
+                      <a:prstDash val="solid"/>
+                      <a:round/>
+                      <a:headEnd type="none" w="med" len="med"/>
+                      <a:tailEnd type="none" w="med" len="med"/>
+                    </a:lnR>
+                    <a:lnT w="12700" cap="flat" cmpd="sng" algn="ctr">
+                      <a:solidFill>
+                        <a:schemeClr val="tx1"/>
+                      </a:solidFill>
+                      <a:prstDash val="solid"/>
+                      <a:round/>
+                      <a:headEnd type="none" w="med" len="med"/>
+                      <a:tailEnd type="none" w="med" len="med"/>
+                    </a:lnT>
+                    <a:lnB w="12700" cap="flat" cmpd="sng" algn="ctr">
+                      <a:solidFill>
+                        <a:schemeClr val="tx1"/>
+                      </a:solidFill>
+                      <a:prstDash val="solid"/>
+                      <a:round/>
+                      <a:headEnd type="none" w="med" len="med"/>
+                      <a:tailEnd type="none" w="med" len="med"/>
+                    </a:lnB>
+                    <a:lnTlToBr w="12700" cmpd="sng">
+                      <a:noFill/>
+                      <a:prstDash val="solid"/>
+                    </a:lnTlToBr>
+                    <a:lnBlToTr w="12700" cmpd="sng">
+                      <a:noFill/>
+                      <a:prstDash val="solid"/>
+                    </a:lnBlToTr>
+                    <a:solidFill>
+                      <a:schemeClr val="bg1"/>
+                    </a:solidFill>
+                  </a:tcPr>
+                </a:tc>
+                <a:extLst>
+                  <a:ext uri="{0D108BD9-81ED-4DB2-BD59-A6C34878D82A}">
+                    <a16:rowId xmlns:a16="http://schemas.microsoft.com/office/drawing/2014/main" val="1139786997"/>
+                  </a:ext>
+                </a:extLst>
+              </a:tr>
+              <a:tr h="307347">
+                <a:tc>
+                  <a:txBody>
+                    <a:bodyPr/>
+                    <a:lstStyle/>
+                    <a:p>
+                      <a:pPr marL="0" marR="0">
+                        <a:lnSpc>
+                          <a:spcPct val="107000"/>
+                        </a:lnSpc>
+                        <a:spcBef>
+                          <a:spcPts val="0"/>
+                        </a:spcBef>
+                        <a:spcAft>
+                          <a:spcPts val="800"/>
+                        </a:spcAft>
+                      </a:pPr>
+                      <a:r>
+                        <a:rPr lang="en-US" sz="1600">
+                          <a:effectLst/>
+                        </a:rPr>
+                        <a:t>Tuesday</a:t>
+                      </a:r>
+                      <a:endParaRPr lang="en-US" sz="1600">
+                        <a:effectLst/>
+                        <a:latin typeface="Calibri" panose="020F0502020204030204" pitchFamily="34" charset="0"/>
+                        <a:ea typeface="Calibri" panose="020F0502020204030204" pitchFamily="34" charset="0"/>
+                        <a:cs typeface="Times New Roman" panose="02020603050405020304" pitchFamily="18" charset="0"/>
+                      </a:endParaRPr>
+                    </a:p>
+                  </a:txBody>
+                  <a:tcPr marL="15875" marR="15875" marT="15875" marB="15875" anchor="ctr">
+                    <a:lnL w="12700" cap="flat" cmpd="sng" algn="ctr">
+                      <a:solidFill>
+                        <a:schemeClr val="tx1"/>
+                      </a:solidFill>
+                      <a:prstDash val="solid"/>
+                      <a:round/>
+                      <a:headEnd type="none" w="med" len="med"/>
+                      <a:tailEnd type="none" w="med" len="med"/>
+                    </a:lnL>
+                    <a:lnR w="12700" cap="flat" cmpd="sng" algn="ctr">
+                      <a:solidFill>
+                        <a:schemeClr val="tx1"/>
+                      </a:solidFill>
+                      <a:prstDash val="solid"/>
+                      <a:round/>
+                      <a:headEnd type="none" w="med" len="med"/>
+                      <a:tailEnd type="none" w="med" len="med"/>
+                    </a:lnR>
+                    <a:lnT w="12700" cap="flat" cmpd="sng" algn="ctr">
+                      <a:solidFill>
+                        <a:schemeClr val="tx1"/>
+                      </a:solidFill>
+                      <a:prstDash val="solid"/>
+                      <a:round/>
+                      <a:headEnd type="none" w="med" len="med"/>
+                      <a:tailEnd type="none" w="med" len="med"/>
+                    </a:lnT>
+                    <a:lnB w="12700" cap="flat" cmpd="sng" algn="ctr">
+                      <a:solidFill>
+                        <a:schemeClr val="tx1"/>
+                      </a:solidFill>
+                      <a:prstDash val="solid"/>
+                      <a:round/>
+                      <a:headEnd type="none" w="med" len="med"/>
+                      <a:tailEnd type="none" w="med" len="med"/>
+                    </a:lnB>
+                    <a:lnTlToBr w="12700" cmpd="sng">
+                      <a:noFill/>
+                      <a:prstDash val="solid"/>
+                    </a:lnTlToBr>
+                    <a:lnBlToTr w="12700" cmpd="sng">
+                      <a:noFill/>
+                      <a:prstDash val="solid"/>
+                    </a:lnBlToTr>
+                    <a:solidFill>
+                      <a:schemeClr val="bg1"/>
+                    </a:solidFill>
+                  </a:tcPr>
+                </a:tc>
+                <a:tc>
+                  <a:txBody>
+                    <a:bodyPr/>
+                    <a:lstStyle/>
+                    <a:p>
+                      <a:pPr marL="0" marR="0">
+                        <a:lnSpc>
+                          <a:spcPct val="107000"/>
+                        </a:lnSpc>
+                        <a:spcBef>
+                          <a:spcPts val="0"/>
+                        </a:spcBef>
+                        <a:spcAft>
+                          <a:spcPts val="800"/>
+                        </a:spcAft>
+                      </a:pPr>
+                      <a:r>
+                        <a:rPr lang="en-US" sz="1600">
+                          <a:effectLst/>
+                        </a:rPr>
+                        <a:t>6 PM - 8 PM : Teams</a:t>
+                      </a:r>
+                      <a:endParaRPr lang="en-US" sz="1600">
+                        <a:effectLst/>
+                        <a:latin typeface="Calibri" panose="020F0502020204030204" pitchFamily="34" charset="0"/>
+                        <a:ea typeface="Calibri" panose="020F0502020204030204" pitchFamily="34" charset="0"/>
+                        <a:cs typeface="Times New Roman" panose="02020603050405020304" pitchFamily="18" charset="0"/>
+                      </a:endParaRPr>
+                    </a:p>
+                  </a:txBody>
+                  <a:tcPr marL="15875" marR="15875" marT="15875" marB="15875" anchor="ctr">
+                    <a:lnL w="12700" cap="flat" cmpd="sng" algn="ctr">
+                      <a:solidFill>
+                        <a:schemeClr val="tx1"/>
+                      </a:solidFill>
+                      <a:prstDash val="solid"/>
+                      <a:round/>
+                      <a:headEnd type="none" w="med" len="med"/>
+                      <a:tailEnd type="none" w="med" len="med"/>
+                    </a:lnL>
+                    <a:lnR w="12700" cap="flat" cmpd="sng" algn="ctr">
+                      <a:solidFill>
+                        <a:schemeClr val="tx1"/>
+                      </a:solidFill>
+                      <a:prstDash val="solid"/>
+                      <a:round/>
+                      <a:headEnd type="none" w="med" len="med"/>
+                      <a:tailEnd type="none" w="med" len="med"/>
+                    </a:lnR>
+                    <a:lnT w="12700" cap="flat" cmpd="sng" algn="ctr">
+                      <a:solidFill>
+                        <a:schemeClr val="tx1"/>
+                      </a:solidFill>
+                      <a:prstDash val="solid"/>
+                      <a:round/>
+                      <a:headEnd type="none" w="med" len="med"/>
+                      <a:tailEnd type="none" w="med" len="med"/>
+                    </a:lnT>
+                    <a:lnB w="12700" cap="flat" cmpd="sng" algn="ctr">
+                      <a:solidFill>
+                        <a:schemeClr val="tx1"/>
+                      </a:solidFill>
+                      <a:prstDash val="solid"/>
+                      <a:round/>
+                      <a:headEnd type="none" w="med" len="med"/>
+                      <a:tailEnd type="none" w="med" len="med"/>
+                    </a:lnB>
+                    <a:lnTlToBr w="12700" cmpd="sng">
+                      <a:noFill/>
+                      <a:prstDash val="solid"/>
+                    </a:lnTlToBr>
+                    <a:lnBlToTr w="12700" cmpd="sng">
+                      <a:noFill/>
+                      <a:prstDash val="solid"/>
+                    </a:lnBlToTr>
+                    <a:solidFill>
+                      <a:schemeClr val="bg1"/>
+                    </a:solidFill>
+                  </a:tcPr>
+                </a:tc>
+                <a:extLst>
+                  <a:ext uri="{0D108BD9-81ED-4DB2-BD59-A6C34878D82A}">
+                    <a16:rowId xmlns:a16="http://schemas.microsoft.com/office/drawing/2014/main" val="1164388044"/>
+                  </a:ext>
+                </a:extLst>
+              </a:tr>
+              <a:tr h="581669">
+                <a:tc>
+                  <a:txBody>
+                    <a:bodyPr/>
+                    <a:lstStyle/>
+                    <a:p>
+                      <a:pPr marL="0" marR="0">
+                        <a:lnSpc>
+                          <a:spcPct val="107000"/>
+                        </a:lnSpc>
+                        <a:spcBef>
+                          <a:spcPts val="0"/>
+                        </a:spcBef>
+                        <a:spcAft>
+                          <a:spcPts val="800"/>
+                        </a:spcAft>
+                      </a:pPr>
+                      <a:r>
+                        <a:rPr lang="en-US" sz="1600">
+                          <a:effectLst/>
+                        </a:rPr>
+                        <a:t>Wednesday</a:t>
+                      </a:r>
+                      <a:endParaRPr lang="en-US" sz="1600">
+                        <a:effectLst/>
+                        <a:latin typeface="Calibri" panose="020F0502020204030204" pitchFamily="34" charset="0"/>
+                        <a:ea typeface="Calibri" panose="020F0502020204030204" pitchFamily="34" charset="0"/>
+                        <a:cs typeface="Times New Roman" panose="02020603050405020304" pitchFamily="18" charset="0"/>
+                      </a:endParaRPr>
+                    </a:p>
+                  </a:txBody>
+                  <a:tcPr marL="15875" marR="15875" marT="15875" marB="15875" anchor="ctr">
+                    <a:lnL w="12700" cap="flat" cmpd="sng" algn="ctr">
+                      <a:solidFill>
+                        <a:schemeClr val="tx1"/>
+                      </a:solidFill>
+                      <a:prstDash val="solid"/>
+                      <a:round/>
+                      <a:headEnd type="none" w="med" len="med"/>
+                      <a:tailEnd type="none" w="med" len="med"/>
+                    </a:lnL>
+                    <a:lnR w="12700" cap="flat" cmpd="sng" algn="ctr">
+                      <a:solidFill>
+                        <a:schemeClr val="tx1"/>
+                      </a:solidFill>
+                      <a:prstDash val="solid"/>
+                      <a:round/>
+                      <a:headEnd type="none" w="med" len="med"/>
+                      <a:tailEnd type="none" w="med" len="med"/>
+                    </a:lnR>
+                    <a:lnT w="12700" cap="flat" cmpd="sng" algn="ctr">
+                      <a:solidFill>
+                        <a:schemeClr val="tx1"/>
+                      </a:solidFill>
+                      <a:prstDash val="solid"/>
+                      <a:round/>
+                      <a:headEnd type="none" w="med" len="med"/>
+                      <a:tailEnd type="none" w="med" len="med"/>
+                    </a:lnT>
+                    <a:lnB w="12700" cap="flat" cmpd="sng" algn="ctr">
+                      <a:solidFill>
+                        <a:schemeClr val="tx1"/>
+                      </a:solidFill>
+                      <a:prstDash val="solid"/>
+                      <a:round/>
+                      <a:headEnd type="none" w="med" len="med"/>
+                      <a:tailEnd type="none" w="med" len="med"/>
+                    </a:lnB>
+                    <a:lnTlToBr w="12700" cmpd="sng">
+                      <a:noFill/>
+                      <a:prstDash val="solid"/>
+                    </a:lnTlToBr>
+                    <a:lnBlToTr w="12700" cmpd="sng">
+                      <a:noFill/>
+                      <a:prstDash val="solid"/>
+                    </a:lnBlToTr>
+                    <a:solidFill>
+                      <a:schemeClr val="bg1"/>
+                    </a:solidFill>
+                  </a:tcPr>
+                </a:tc>
+                <a:tc>
+                  <a:txBody>
+                    <a:bodyPr/>
+                    <a:lstStyle/>
+                    <a:p>
+                      <a:pPr marL="0" marR="0">
+                        <a:lnSpc>
+                          <a:spcPct val="107000"/>
+                        </a:lnSpc>
+                        <a:spcBef>
+                          <a:spcPts val="0"/>
+                        </a:spcBef>
+                        <a:spcAft>
+                          <a:spcPts val="800"/>
+                        </a:spcAft>
+                      </a:pPr>
+                      <a:r>
+                        <a:rPr lang="en-US" sz="1600">
+                          <a:effectLst/>
+                        </a:rPr>
+                        <a:t>3 PM - 5 PM : CSB 120</a:t>
+                      </a:r>
+                      <a:endParaRPr lang="en-US" sz="1600">
+                        <a:effectLst/>
+                        <a:latin typeface="Calibri" panose="020F0502020204030204" pitchFamily="34" charset="0"/>
+                        <a:ea typeface="Calibri" panose="020F0502020204030204" pitchFamily="34" charset="0"/>
+                        <a:cs typeface="Times New Roman" panose="02020603050405020304" pitchFamily="18" charset="0"/>
+                      </a:endParaRPr>
+                    </a:p>
+                  </a:txBody>
+                  <a:tcPr marL="15875" marR="15875" marT="15875" marB="15875" anchor="ctr">
+                    <a:lnL w="12700" cap="flat" cmpd="sng" algn="ctr">
+                      <a:solidFill>
+                        <a:schemeClr val="tx1"/>
+                      </a:solidFill>
+                      <a:prstDash val="solid"/>
+                      <a:round/>
+                      <a:headEnd type="none" w="med" len="med"/>
+                      <a:tailEnd type="none" w="med" len="med"/>
+                    </a:lnL>
+                    <a:lnR w="12700" cap="flat" cmpd="sng" algn="ctr">
+                      <a:solidFill>
+                        <a:schemeClr val="tx1"/>
+                      </a:solidFill>
+                      <a:prstDash val="solid"/>
+                      <a:round/>
+                      <a:headEnd type="none" w="med" len="med"/>
+                      <a:tailEnd type="none" w="med" len="med"/>
+                    </a:lnR>
+                    <a:lnT w="12700" cap="flat" cmpd="sng" algn="ctr">
+                      <a:solidFill>
+                        <a:schemeClr val="tx1"/>
+                      </a:solidFill>
+                      <a:prstDash val="solid"/>
+                      <a:round/>
+                      <a:headEnd type="none" w="med" len="med"/>
+                      <a:tailEnd type="none" w="med" len="med"/>
+                    </a:lnT>
+                    <a:lnB w="12700" cap="flat" cmpd="sng" algn="ctr">
+                      <a:solidFill>
+                        <a:schemeClr val="tx1"/>
+                      </a:solidFill>
+                      <a:prstDash val="solid"/>
+                      <a:round/>
+                      <a:headEnd type="none" w="med" len="med"/>
+                      <a:tailEnd type="none" w="med" len="med"/>
+                    </a:lnB>
+                    <a:lnTlToBr w="12700" cmpd="sng">
+                      <a:noFill/>
+                      <a:prstDash val="solid"/>
+                    </a:lnTlToBr>
+                    <a:lnBlToTr w="12700" cmpd="sng">
+                      <a:noFill/>
+                      <a:prstDash val="solid"/>
+                    </a:lnBlToTr>
+                    <a:solidFill>
+                      <a:schemeClr val="bg1"/>
+                    </a:solidFill>
+                  </a:tcPr>
+                </a:tc>
+                <a:extLst>
+                  <a:ext uri="{0D108BD9-81ED-4DB2-BD59-A6C34878D82A}">
+                    <a16:rowId xmlns:a16="http://schemas.microsoft.com/office/drawing/2014/main" val="1097778555"/>
+                  </a:ext>
+                </a:extLst>
+              </a:tr>
+              <a:tr h="307347">
+                <a:tc>
+                  <a:txBody>
+                    <a:bodyPr/>
+                    <a:lstStyle/>
+                    <a:p>
+                      <a:pPr marL="0" marR="0">
+                        <a:lnSpc>
+                          <a:spcPct val="107000"/>
+                        </a:lnSpc>
+                        <a:spcBef>
+                          <a:spcPts val="0"/>
+                        </a:spcBef>
+                        <a:spcAft>
+                          <a:spcPts val="800"/>
+                        </a:spcAft>
+                      </a:pPr>
+                      <a:r>
+                        <a:rPr lang="en-US" sz="1600">
+                          <a:effectLst/>
+                        </a:rPr>
+                        <a:t>Thursday</a:t>
+                      </a:r>
+                      <a:endParaRPr lang="en-US" sz="1600">
+                        <a:effectLst/>
+                        <a:latin typeface="Calibri" panose="020F0502020204030204" pitchFamily="34" charset="0"/>
+                        <a:ea typeface="Calibri" panose="020F0502020204030204" pitchFamily="34" charset="0"/>
+                        <a:cs typeface="Times New Roman" panose="02020603050405020304" pitchFamily="18" charset="0"/>
+                      </a:endParaRPr>
+                    </a:p>
+                  </a:txBody>
+                  <a:tcPr marL="15875" marR="15875" marT="15875" marB="15875" anchor="ctr">
+                    <a:lnL w="12700" cap="flat" cmpd="sng" algn="ctr">
+                      <a:solidFill>
+                        <a:schemeClr val="tx1"/>
+                      </a:solidFill>
+                      <a:prstDash val="solid"/>
+                      <a:round/>
+                      <a:headEnd type="none" w="med" len="med"/>
+                      <a:tailEnd type="none" w="med" len="med"/>
+                    </a:lnL>
+                    <a:lnR w="12700" cap="flat" cmpd="sng" algn="ctr">
+                      <a:solidFill>
+                        <a:schemeClr val="tx1"/>
+                      </a:solidFill>
+                      <a:prstDash val="solid"/>
+                      <a:round/>
+                      <a:headEnd type="none" w="med" len="med"/>
+                      <a:tailEnd type="none" w="med" len="med"/>
+                    </a:lnR>
+                    <a:lnT w="12700" cap="flat" cmpd="sng" algn="ctr">
+                      <a:solidFill>
+                        <a:schemeClr val="tx1"/>
+                      </a:solidFill>
+                      <a:prstDash val="solid"/>
+                      <a:round/>
+                      <a:headEnd type="none" w="med" len="med"/>
+                      <a:tailEnd type="none" w="med" len="med"/>
+                    </a:lnT>
+                    <a:lnB w="12700" cap="flat" cmpd="sng" algn="ctr">
+                      <a:solidFill>
+                        <a:schemeClr val="tx1"/>
+                      </a:solidFill>
+                      <a:prstDash val="solid"/>
+                      <a:round/>
+                      <a:headEnd type="none" w="med" len="med"/>
+                      <a:tailEnd type="none" w="med" len="med"/>
+                    </a:lnB>
+                    <a:lnTlToBr w="12700" cmpd="sng">
+                      <a:noFill/>
+                      <a:prstDash val="solid"/>
+                    </a:lnTlToBr>
+                    <a:lnBlToTr w="12700" cmpd="sng">
+                      <a:noFill/>
+                      <a:prstDash val="solid"/>
+                    </a:lnBlToTr>
+                    <a:solidFill>
+                      <a:schemeClr val="bg1"/>
+                    </a:solidFill>
+                  </a:tcPr>
+                </a:tc>
+                <a:tc>
+                  <a:txBody>
+                    <a:bodyPr/>
+                    <a:lstStyle/>
+                    <a:p>
+                      <a:pPr marL="0" marR="0">
+                        <a:lnSpc>
+                          <a:spcPct val="107000"/>
+                        </a:lnSpc>
+                        <a:spcBef>
+                          <a:spcPts val="0"/>
+                        </a:spcBef>
+                        <a:spcAft>
+                          <a:spcPts val="800"/>
+                        </a:spcAft>
+                      </a:pPr>
+                      <a:r>
+                        <a:rPr lang="en-US" sz="1600">
+                          <a:effectLst/>
+                        </a:rPr>
+                        <a:t>6 PM - 8 PM : Teams</a:t>
+                      </a:r>
+                      <a:endParaRPr lang="en-US" sz="1600">
+                        <a:effectLst/>
+                        <a:latin typeface="Calibri" panose="020F0502020204030204" pitchFamily="34" charset="0"/>
+                        <a:ea typeface="Calibri" panose="020F0502020204030204" pitchFamily="34" charset="0"/>
+                        <a:cs typeface="Times New Roman" panose="02020603050405020304" pitchFamily="18" charset="0"/>
+                      </a:endParaRPr>
+                    </a:p>
+                  </a:txBody>
+                  <a:tcPr marL="15875" marR="15875" marT="15875" marB="15875" anchor="ctr">
+                    <a:lnL w="12700" cap="flat" cmpd="sng" algn="ctr">
+                      <a:solidFill>
+                        <a:schemeClr val="tx1"/>
+                      </a:solidFill>
+                      <a:prstDash val="solid"/>
+                      <a:round/>
+                      <a:headEnd type="none" w="med" len="med"/>
+                      <a:tailEnd type="none" w="med" len="med"/>
+                    </a:lnL>
+                    <a:lnR w="12700" cap="flat" cmpd="sng" algn="ctr">
+                      <a:solidFill>
+                        <a:schemeClr val="tx1"/>
+                      </a:solidFill>
+                      <a:prstDash val="solid"/>
+                      <a:round/>
+                      <a:headEnd type="none" w="med" len="med"/>
+                      <a:tailEnd type="none" w="med" len="med"/>
+                    </a:lnR>
+                    <a:lnT w="12700" cap="flat" cmpd="sng" algn="ctr">
+                      <a:solidFill>
+                        <a:schemeClr val="tx1"/>
+                      </a:solidFill>
+                      <a:prstDash val="solid"/>
+                      <a:round/>
+                      <a:headEnd type="none" w="med" len="med"/>
+                      <a:tailEnd type="none" w="med" len="med"/>
+                    </a:lnT>
+                    <a:lnB w="12700" cap="flat" cmpd="sng" algn="ctr">
+                      <a:solidFill>
+                        <a:schemeClr val="tx1"/>
+                      </a:solidFill>
+                      <a:prstDash val="solid"/>
+                      <a:round/>
+                      <a:headEnd type="none" w="med" len="med"/>
+                      <a:tailEnd type="none" w="med" len="med"/>
+                    </a:lnB>
+                    <a:lnTlToBr w="12700" cmpd="sng">
+                      <a:noFill/>
+                      <a:prstDash val="solid"/>
+                    </a:lnTlToBr>
+                    <a:lnBlToTr w="12700" cmpd="sng">
+                      <a:noFill/>
+                      <a:prstDash val="solid"/>
+                    </a:lnBlToTr>
+                    <a:solidFill>
+                      <a:schemeClr val="bg1"/>
+                    </a:solidFill>
+                  </a:tcPr>
+                </a:tc>
+                <a:extLst>
+                  <a:ext uri="{0D108BD9-81ED-4DB2-BD59-A6C34878D82A}">
+                    <a16:rowId xmlns:a16="http://schemas.microsoft.com/office/drawing/2014/main" val="1747960062"/>
+                  </a:ext>
+                </a:extLst>
+              </a:tr>
+              <a:tr h="581669">
+                <a:tc>
+                  <a:txBody>
+                    <a:bodyPr/>
+                    <a:lstStyle/>
+                    <a:p>
+                      <a:pPr marL="0" marR="0">
+                        <a:lnSpc>
+                          <a:spcPct val="107000"/>
+                        </a:lnSpc>
+                        <a:spcBef>
+                          <a:spcPts val="0"/>
+                        </a:spcBef>
+                        <a:spcAft>
+                          <a:spcPts val="800"/>
+                        </a:spcAft>
+                      </a:pPr>
+                      <a:r>
+                        <a:rPr lang="en-US" sz="1600">
+                          <a:effectLst/>
+                        </a:rPr>
+                        <a:t>Friday</a:t>
+                      </a:r>
+                      <a:endParaRPr lang="en-US" sz="1600">
+                        <a:effectLst/>
+                        <a:latin typeface="Calibri" panose="020F0502020204030204" pitchFamily="34" charset="0"/>
+                        <a:ea typeface="Calibri" panose="020F0502020204030204" pitchFamily="34" charset="0"/>
+                        <a:cs typeface="Times New Roman" panose="02020603050405020304" pitchFamily="18" charset="0"/>
+                      </a:endParaRPr>
+                    </a:p>
+                  </a:txBody>
+                  <a:tcPr marL="15875" marR="15875" marT="15875" marB="15875" anchor="ctr">
+                    <a:lnL w="12700" cap="flat" cmpd="sng" algn="ctr">
+                      <a:solidFill>
+                        <a:schemeClr val="tx1"/>
+                      </a:solidFill>
+                      <a:prstDash val="solid"/>
+                      <a:round/>
+                      <a:headEnd type="none" w="med" len="med"/>
+                      <a:tailEnd type="none" w="med" len="med"/>
+                    </a:lnL>
+                    <a:lnR w="12700" cap="flat" cmpd="sng" algn="ctr">
+                      <a:solidFill>
+                        <a:schemeClr val="tx1"/>
+                      </a:solidFill>
+                      <a:prstDash val="solid"/>
+                      <a:round/>
+                      <a:headEnd type="none" w="med" len="med"/>
+                      <a:tailEnd type="none" w="med" len="med"/>
+                    </a:lnR>
+                    <a:lnT w="12700" cap="flat" cmpd="sng" algn="ctr">
+                      <a:solidFill>
+                        <a:schemeClr val="tx1"/>
+                      </a:solidFill>
+                      <a:prstDash val="solid"/>
+                      <a:round/>
+                      <a:headEnd type="none" w="med" len="med"/>
+                      <a:tailEnd type="none" w="med" len="med"/>
+                    </a:lnT>
+                    <a:lnB w="12700" cap="flat" cmpd="sng" algn="ctr">
+                      <a:solidFill>
+                        <a:schemeClr val="tx1"/>
+                      </a:solidFill>
+                      <a:prstDash val="solid"/>
+                      <a:round/>
+                      <a:headEnd type="none" w="med" len="med"/>
+                      <a:tailEnd type="none" w="med" len="med"/>
+                    </a:lnB>
+                    <a:lnTlToBr w="12700" cmpd="sng">
+                      <a:noFill/>
+                      <a:prstDash val="solid"/>
+                    </a:lnTlToBr>
+                    <a:lnBlToTr w="12700" cmpd="sng">
+                      <a:noFill/>
+                      <a:prstDash val="solid"/>
+                    </a:lnBlToTr>
+                    <a:solidFill>
+                      <a:schemeClr val="bg1"/>
+                    </a:solidFill>
+                  </a:tcPr>
+                </a:tc>
+                <a:tc>
+                  <a:txBody>
+                    <a:bodyPr/>
+                    <a:lstStyle/>
+                    <a:p>
+                      <a:pPr marL="0" marR="0">
+                        <a:lnSpc>
+                          <a:spcPct val="107000"/>
+                        </a:lnSpc>
+                        <a:spcBef>
+                          <a:spcPts val="0"/>
+                        </a:spcBef>
+                        <a:spcAft>
+                          <a:spcPts val="800"/>
+                        </a:spcAft>
+                      </a:pPr>
+                      <a:r>
+                        <a:rPr lang="en-US" sz="1600">
+                          <a:effectLst/>
+                        </a:rPr>
+                        <a:t>3 PM - 5 PM : CSB 120</a:t>
+                      </a:r>
+                      <a:endParaRPr lang="en-US" sz="1600">
+                        <a:effectLst/>
+                        <a:latin typeface="Calibri" panose="020F0502020204030204" pitchFamily="34" charset="0"/>
+                        <a:ea typeface="Calibri" panose="020F0502020204030204" pitchFamily="34" charset="0"/>
+                        <a:cs typeface="Times New Roman" panose="02020603050405020304" pitchFamily="18" charset="0"/>
+                      </a:endParaRPr>
+                    </a:p>
+                  </a:txBody>
+                  <a:tcPr marL="15875" marR="15875" marT="15875" marB="15875" anchor="ctr">
+                    <a:lnL w="12700" cap="flat" cmpd="sng" algn="ctr">
+                      <a:solidFill>
+                        <a:schemeClr val="tx1"/>
+                      </a:solidFill>
+                      <a:prstDash val="solid"/>
+                      <a:round/>
+                      <a:headEnd type="none" w="med" len="med"/>
+                      <a:tailEnd type="none" w="med" len="med"/>
+                    </a:lnL>
+                    <a:lnR w="12700" cap="flat" cmpd="sng" algn="ctr">
+                      <a:solidFill>
+                        <a:schemeClr val="tx1"/>
+                      </a:solidFill>
+                      <a:prstDash val="solid"/>
+                      <a:round/>
+                      <a:headEnd type="none" w="med" len="med"/>
+                      <a:tailEnd type="none" w="med" len="med"/>
+                    </a:lnR>
+                    <a:lnT w="12700" cap="flat" cmpd="sng" algn="ctr">
+                      <a:solidFill>
+                        <a:schemeClr val="tx1"/>
+                      </a:solidFill>
+                      <a:prstDash val="solid"/>
+                      <a:round/>
+                      <a:headEnd type="none" w="med" len="med"/>
+                      <a:tailEnd type="none" w="med" len="med"/>
+                    </a:lnT>
+                    <a:lnB w="12700" cap="flat" cmpd="sng" algn="ctr">
+                      <a:solidFill>
+                        <a:schemeClr val="tx1"/>
+                      </a:solidFill>
+                      <a:prstDash val="solid"/>
+                      <a:round/>
+                      <a:headEnd type="none" w="med" len="med"/>
+                      <a:tailEnd type="none" w="med" len="med"/>
+                    </a:lnB>
+                    <a:lnTlToBr w="12700" cmpd="sng">
+                      <a:noFill/>
+                      <a:prstDash val="solid"/>
+                    </a:lnTlToBr>
+                    <a:lnBlToTr w="12700" cmpd="sng">
+                      <a:noFill/>
+                      <a:prstDash val="solid"/>
+                    </a:lnBlToTr>
+                    <a:solidFill>
+                      <a:schemeClr val="bg1"/>
+                    </a:solidFill>
+                  </a:tcPr>
+                </a:tc>
+                <a:extLst>
+                  <a:ext uri="{0D108BD9-81ED-4DB2-BD59-A6C34878D82A}">
+                    <a16:rowId xmlns:a16="http://schemas.microsoft.com/office/drawing/2014/main" val="1553865624"/>
+                  </a:ext>
+                </a:extLst>
+              </a:tr>
+              <a:tr h="307347">
+                <a:tc>
+                  <a:txBody>
+                    <a:bodyPr/>
+                    <a:lstStyle/>
+                    <a:p>
+                      <a:pPr marL="0" marR="0">
+                        <a:lnSpc>
+                          <a:spcPct val="107000"/>
+                        </a:lnSpc>
+                        <a:spcBef>
+                          <a:spcPts val="0"/>
+                        </a:spcBef>
+                        <a:spcAft>
+                          <a:spcPts val="800"/>
+                        </a:spcAft>
+                      </a:pPr>
+                      <a:r>
+                        <a:rPr lang="en-US" sz="1600">
+                          <a:effectLst/>
+                        </a:rPr>
+                        <a:t>Saturday</a:t>
+                      </a:r>
+                      <a:endParaRPr lang="en-US" sz="1600">
+                        <a:effectLst/>
+                        <a:latin typeface="Calibri" panose="020F0502020204030204" pitchFamily="34" charset="0"/>
+                        <a:ea typeface="Calibri" panose="020F0502020204030204" pitchFamily="34" charset="0"/>
+                        <a:cs typeface="Times New Roman" panose="02020603050405020304" pitchFamily="18" charset="0"/>
+                      </a:endParaRPr>
+                    </a:p>
+                  </a:txBody>
+                  <a:tcPr marL="15875" marR="15875" marT="15875" marB="15875" anchor="ctr">
+                    <a:lnL w="12700" cap="flat" cmpd="sng" algn="ctr">
+                      <a:solidFill>
+                        <a:schemeClr val="tx1"/>
+                      </a:solidFill>
+                      <a:prstDash val="solid"/>
+                      <a:round/>
+                      <a:headEnd type="none" w="med" len="med"/>
+                      <a:tailEnd type="none" w="med" len="med"/>
+                    </a:lnL>
+                    <a:lnR w="12700" cap="flat" cmpd="sng" algn="ctr">
+                      <a:solidFill>
+                        <a:schemeClr val="tx1"/>
+                      </a:solidFill>
+                      <a:prstDash val="solid"/>
+                      <a:round/>
+                      <a:headEnd type="none" w="med" len="med"/>
+                      <a:tailEnd type="none" w="med" len="med"/>
+                    </a:lnR>
+                    <a:lnT w="12700" cap="flat" cmpd="sng" algn="ctr">
+                      <a:solidFill>
+                        <a:schemeClr val="tx1"/>
+                      </a:solidFill>
+                      <a:prstDash val="solid"/>
+                      <a:round/>
+                      <a:headEnd type="none" w="med" len="med"/>
+                      <a:tailEnd type="none" w="med" len="med"/>
+                    </a:lnT>
+                    <a:lnB w="12700" cap="flat" cmpd="sng" algn="ctr">
+                      <a:solidFill>
+                        <a:schemeClr val="tx1"/>
+                      </a:solidFill>
+                      <a:prstDash val="solid"/>
+                      <a:round/>
+                      <a:headEnd type="none" w="med" len="med"/>
+                      <a:tailEnd type="none" w="med" len="med"/>
+                    </a:lnB>
+                    <a:lnTlToBr w="12700" cmpd="sng">
+                      <a:noFill/>
+                      <a:prstDash val="solid"/>
+                    </a:lnTlToBr>
+                    <a:lnBlToTr w="12700" cmpd="sng">
+                      <a:noFill/>
+                      <a:prstDash val="solid"/>
+                    </a:lnBlToTr>
+                    <a:solidFill>
+                      <a:schemeClr val="bg1"/>
+                    </a:solidFill>
+                  </a:tcPr>
+                </a:tc>
+                <a:tc>
+                  <a:txBody>
+                    <a:bodyPr/>
+                    <a:lstStyle/>
+                    <a:p>
+                      <a:pPr marL="0" marR="0">
+                        <a:lnSpc>
+                          <a:spcPct val="107000"/>
+                        </a:lnSpc>
+                        <a:spcBef>
+                          <a:spcPts val="0"/>
+                        </a:spcBef>
+                        <a:spcAft>
+                          <a:spcPts val="800"/>
+                        </a:spcAft>
+                      </a:pPr>
+                      <a:r>
+                        <a:rPr lang="en-US" sz="1600" dirty="0">
+                          <a:effectLst/>
+                        </a:rPr>
+                        <a:t>12 PM - 4 PM : Teams</a:t>
+                      </a:r>
+                      <a:endParaRPr lang="en-US" sz="1600" dirty="0">
+                        <a:effectLst/>
+                        <a:latin typeface="Calibri" panose="020F0502020204030204" pitchFamily="34" charset="0"/>
+                        <a:ea typeface="Calibri" panose="020F0502020204030204" pitchFamily="34" charset="0"/>
+                        <a:cs typeface="Times New Roman" panose="02020603050405020304" pitchFamily="18" charset="0"/>
+                      </a:endParaRPr>
+                    </a:p>
+                  </a:txBody>
+                  <a:tcPr marL="15875" marR="15875" marT="15875" marB="15875" anchor="ctr">
+                    <a:lnL w="12700" cap="flat" cmpd="sng" algn="ctr">
+                      <a:solidFill>
+                        <a:schemeClr val="tx1"/>
+                      </a:solidFill>
+                      <a:prstDash val="solid"/>
+                      <a:round/>
+                      <a:headEnd type="none" w="med" len="med"/>
+                      <a:tailEnd type="none" w="med" len="med"/>
+                    </a:lnL>
+                    <a:lnR w="12700" cap="flat" cmpd="sng" algn="ctr">
+                      <a:solidFill>
+                        <a:schemeClr val="tx1"/>
+                      </a:solidFill>
+                      <a:prstDash val="solid"/>
+                      <a:round/>
+                      <a:headEnd type="none" w="med" len="med"/>
+                      <a:tailEnd type="none" w="med" len="med"/>
+                    </a:lnR>
+                    <a:lnT w="12700" cap="flat" cmpd="sng" algn="ctr">
+                      <a:solidFill>
+                        <a:schemeClr val="tx1"/>
+                      </a:solidFill>
+                      <a:prstDash val="solid"/>
+                      <a:round/>
+                      <a:headEnd type="none" w="med" len="med"/>
+                      <a:tailEnd type="none" w="med" len="med"/>
+                    </a:lnT>
+                    <a:lnB w="12700" cap="flat" cmpd="sng" algn="ctr">
+                      <a:solidFill>
+                        <a:schemeClr val="tx1"/>
+                      </a:solidFill>
+                      <a:prstDash val="solid"/>
+                      <a:round/>
+                      <a:headEnd type="none" w="med" len="med"/>
+                      <a:tailEnd type="none" w="med" len="med"/>
+                    </a:lnB>
+                    <a:lnTlToBr w="12700" cmpd="sng">
+                      <a:noFill/>
+                      <a:prstDash val="solid"/>
+                    </a:lnTlToBr>
+                    <a:lnBlToTr w="12700" cmpd="sng">
+                      <a:noFill/>
+                      <a:prstDash val="solid"/>
+                    </a:lnBlToTr>
+                    <a:solidFill>
+                      <a:schemeClr val="bg1"/>
+                    </a:solidFill>
+                  </a:tcPr>
+                </a:tc>
+                <a:extLst>
+                  <a:ext uri="{0D108BD9-81ED-4DB2-BD59-A6C34878D82A}">
+                    <a16:rowId xmlns:a16="http://schemas.microsoft.com/office/drawing/2014/main" val="3921746368"/>
+                  </a:ext>
+                </a:extLst>
+              </a:tr>
+              <a:tr h="307347">
+                <a:tc>
+                  <a:txBody>
+                    <a:bodyPr/>
+                    <a:lstStyle/>
+                    <a:p>
+                      <a:pPr marL="0" marR="0">
+                        <a:lnSpc>
+                          <a:spcPct val="107000"/>
+                        </a:lnSpc>
+                        <a:spcBef>
+                          <a:spcPts val="0"/>
+                        </a:spcBef>
+                        <a:spcAft>
+                          <a:spcPts val="800"/>
+                        </a:spcAft>
+                      </a:pPr>
+                      <a:r>
+                        <a:rPr lang="en-US" sz="1600" dirty="0">
+                          <a:effectLst/>
+                        </a:rPr>
+                        <a:t>Sunday</a:t>
+                      </a:r>
+                      <a:endParaRPr lang="en-US" sz="1600" dirty="0">
+                        <a:effectLst/>
+                        <a:latin typeface="Calibri" panose="020F0502020204030204" pitchFamily="34" charset="0"/>
+                        <a:ea typeface="Calibri" panose="020F0502020204030204" pitchFamily="34" charset="0"/>
+                        <a:cs typeface="Times New Roman" panose="02020603050405020304" pitchFamily="18" charset="0"/>
+                      </a:endParaRPr>
+                    </a:p>
+                  </a:txBody>
+                  <a:tcPr marL="15875" marR="15875" marT="15875" marB="15875" anchor="ctr">
+                    <a:lnL w="12700" cap="flat" cmpd="sng" algn="ctr">
+                      <a:solidFill>
+                        <a:schemeClr val="tx1"/>
+                      </a:solidFill>
+                      <a:prstDash val="solid"/>
+                      <a:round/>
+                      <a:headEnd type="none" w="med" len="med"/>
+                      <a:tailEnd type="none" w="med" len="med"/>
+                    </a:lnL>
+                    <a:lnR w="12700" cap="flat" cmpd="sng" algn="ctr">
+                      <a:solidFill>
+                        <a:schemeClr val="tx1"/>
+                      </a:solidFill>
+                      <a:prstDash val="solid"/>
+                      <a:round/>
+                      <a:headEnd type="none" w="med" len="med"/>
+                      <a:tailEnd type="none" w="med" len="med"/>
+                    </a:lnR>
+                    <a:lnT w="12700" cap="flat" cmpd="sng" algn="ctr">
+                      <a:solidFill>
+                        <a:schemeClr val="tx1"/>
+                      </a:solidFill>
+                      <a:prstDash val="solid"/>
+                      <a:round/>
+                      <a:headEnd type="none" w="med" len="med"/>
+                      <a:tailEnd type="none" w="med" len="med"/>
+                    </a:lnT>
+                    <a:lnB w="12700" cap="flat" cmpd="sng" algn="ctr">
+                      <a:solidFill>
+                        <a:schemeClr val="tx1"/>
+                      </a:solidFill>
+                      <a:prstDash val="solid"/>
+                      <a:round/>
+                      <a:headEnd type="none" w="med" len="med"/>
+                      <a:tailEnd type="none" w="med" len="med"/>
+                    </a:lnB>
+                    <a:lnTlToBr w="12700" cmpd="sng">
+                      <a:noFill/>
+                      <a:prstDash val="solid"/>
+                    </a:lnTlToBr>
+                    <a:lnBlToTr w="12700" cmpd="sng">
+                      <a:noFill/>
+                      <a:prstDash val="solid"/>
+                    </a:lnBlToTr>
+                    <a:solidFill>
+                      <a:schemeClr val="bg1"/>
+                    </a:solidFill>
+                  </a:tcPr>
+                </a:tc>
+                <a:tc>
+                  <a:txBody>
+                    <a:bodyPr/>
+                    <a:lstStyle/>
+                    <a:p>
+                      <a:pPr marL="0" marR="0">
+                        <a:lnSpc>
+                          <a:spcPct val="107000"/>
+                        </a:lnSpc>
+                        <a:spcBef>
+                          <a:spcPts val="0"/>
+                        </a:spcBef>
+                        <a:spcAft>
+                          <a:spcPts val="800"/>
+                        </a:spcAft>
+                      </a:pPr>
+                      <a:r>
+                        <a:rPr lang="en-US" sz="1600" dirty="0">
+                          <a:effectLst/>
+                        </a:rPr>
+                        <a:t>12 PM - 4 PM : Teams</a:t>
+                      </a:r>
+                      <a:endParaRPr lang="en-US" sz="1600" dirty="0">
+                        <a:effectLst/>
+                        <a:latin typeface="Calibri" panose="020F0502020204030204" pitchFamily="34" charset="0"/>
+                        <a:ea typeface="Calibri" panose="020F0502020204030204" pitchFamily="34" charset="0"/>
+                        <a:cs typeface="Times New Roman" panose="02020603050405020304" pitchFamily="18" charset="0"/>
+                      </a:endParaRPr>
+                    </a:p>
+                  </a:txBody>
+                  <a:tcPr marL="15875" marR="15875" marT="15875" marB="15875" anchor="ctr">
+                    <a:lnL w="12700" cap="flat" cmpd="sng" algn="ctr">
+                      <a:solidFill>
+                        <a:schemeClr val="tx1"/>
+                      </a:solidFill>
+                      <a:prstDash val="solid"/>
+                      <a:round/>
+                      <a:headEnd type="none" w="med" len="med"/>
+                      <a:tailEnd type="none" w="med" len="med"/>
+                    </a:lnL>
+                    <a:lnR w="12700" cap="flat" cmpd="sng" algn="ctr">
+                      <a:solidFill>
+                        <a:schemeClr val="tx1"/>
+                      </a:solidFill>
+                      <a:prstDash val="solid"/>
+                      <a:round/>
+                      <a:headEnd type="none" w="med" len="med"/>
+                      <a:tailEnd type="none" w="med" len="med"/>
+                    </a:lnR>
+                    <a:lnT w="12700" cap="flat" cmpd="sng" algn="ctr">
+                      <a:solidFill>
+                        <a:schemeClr val="tx1"/>
+                      </a:solidFill>
+                      <a:prstDash val="solid"/>
+                      <a:round/>
+                      <a:headEnd type="none" w="med" len="med"/>
+                      <a:tailEnd type="none" w="med" len="med"/>
+                    </a:lnT>
+                    <a:lnB w="12700" cap="flat" cmpd="sng" algn="ctr">
+                      <a:solidFill>
+                        <a:schemeClr val="tx1"/>
+                      </a:solidFill>
+                      <a:prstDash val="solid"/>
+                      <a:round/>
+                      <a:headEnd type="none" w="med" len="med"/>
+                      <a:tailEnd type="none" w="med" len="med"/>
+                    </a:lnB>
+                    <a:lnTlToBr w="12700" cmpd="sng">
+                      <a:noFill/>
+                      <a:prstDash val="solid"/>
+                    </a:lnTlToBr>
+                    <a:lnBlToTr w="12700" cmpd="sng">
+                      <a:noFill/>
+                      <a:prstDash val="solid"/>
+                    </a:lnBlToTr>
+                    <a:solidFill>
+                      <a:schemeClr val="bg1"/>
+                    </a:solidFill>
+                  </a:tcPr>
+                </a:tc>
+                <a:extLst>
+                  <a:ext uri="{0D108BD9-81ED-4DB2-BD59-A6C34878D82A}">
+                    <a16:rowId xmlns:a16="http://schemas.microsoft.com/office/drawing/2014/main" val="1928039740"/>
+                  </a:ext>
+                </a:extLst>
+              </a:tr>
+            </a:tbl>
+          </a:graphicData>
+        </a:graphic>
+      </p:graphicFrame>
     </p:spTree>
     <p:extLst>
       <p:ext uri="{BB962C8B-B14F-4D97-AF65-F5344CB8AC3E}">
@@ -12736,8 +13613,8 @@
           </a:p>
         </p:txBody>
       </p:sp>
-      <mc:AlternateContent xmlns:mc="http://schemas.openxmlformats.org/markup-compatibility/2006">
-        <mc:Choice xmlns:p14="http://schemas.microsoft.com/office/powerpoint/2010/main" Requires="p14">
+      <mc:AlternateContent xmlns:mc="http://schemas.openxmlformats.org/markup-compatibility/2006" xmlns:p14="http://schemas.microsoft.com/office/powerpoint/2010/main">
+        <mc:Choice Requires="p14">
           <p:contentPart p14:bwMode="auto" r:id="rId2">
             <p14:nvContentPartPr>
               <p14:cNvPr id="5" name="Ink 4">
@@ -12756,7 +13633,7 @@
             </p14:xfrm>
           </p:contentPart>
         </mc:Choice>
-        <mc:Fallback>
+        <mc:Fallback xmlns="">
           <p:pic>
             <p:nvPicPr>
               <p:cNvPr id="5" name="Ink 4">
@@ -12787,8 +13664,8 @@
           </p:pic>
         </mc:Fallback>
       </mc:AlternateContent>
-      <mc:AlternateContent xmlns:mc="http://schemas.openxmlformats.org/markup-compatibility/2006">
-        <mc:Choice xmlns:p14="http://schemas.microsoft.com/office/powerpoint/2010/main" Requires="p14">
+      <mc:AlternateContent xmlns:mc="http://schemas.openxmlformats.org/markup-compatibility/2006" xmlns:p14="http://schemas.microsoft.com/office/powerpoint/2010/main">
+        <mc:Choice Requires="p14">
           <p:contentPart p14:bwMode="auto" r:id="rId4">
             <p14:nvContentPartPr>
               <p14:cNvPr id="6" name="Ink 5">
@@ -12807,7 +13684,7 @@
             </p14:xfrm>
           </p:contentPart>
         </mc:Choice>
-        <mc:Fallback>
+        <mc:Fallback xmlns="">
           <p:pic>
             <p:nvPicPr>
               <p:cNvPr id="6" name="Ink 5">
@@ -14538,20 +15415,20 @@
 </file>
 
 <file path=customXml/item2.xml><?xml version="1.0" encoding="utf-8"?>
+<p:properties xmlns:p="http://schemas.microsoft.com/office/2006/metadata/properties" xmlns:xsi="http://www.w3.org/2001/XMLSchema-instance" xmlns:pc="http://schemas.microsoft.com/office/infopath/2007/PartnerControls">
+  <documentManagement>
+    <_activity xmlns="92c41bee-f0ee-4aa6-9399-a35fbb883510" xsi:nil="true"/>
+  </documentManagement>
+</p:properties>
+</file>
+
+<file path=customXml/item3.xml><?xml version="1.0" encoding="utf-8"?>
 <?mso-contentType ?>
 <FormTemplates xmlns="http://schemas.microsoft.com/sharepoint/v3/contenttype/forms">
   <Display>DocumentLibraryForm</Display>
   <Edit>DocumentLibraryForm</Edit>
   <New>DocumentLibraryForm</New>
 </FormTemplates>
-</file>
-
-<file path=customXml/item3.xml><?xml version="1.0" encoding="utf-8"?>
-<p:properties xmlns:p="http://schemas.microsoft.com/office/2006/metadata/properties" xmlns:xsi="http://www.w3.org/2001/XMLSchema-instance" xmlns:pc="http://schemas.microsoft.com/office/infopath/2007/PartnerControls">
-  <documentManagement>
-    <_activity xmlns="92c41bee-f0ee-4aa6-9399-a35fbb883510" xsi:nil="true"/>
-  </documentManagement>
-</p:properties>
 </file>
 
 <file path=customXml/itemProps1.xml><?xml version="1.0" encoding="utf-8"?>
@@ -14574,26 +15451,26 @@
 </file>
 
 <file path=customXml/itemProps2.xml><?xml version="1.0" encoding="utf-8"?>
+<ds:datastoreItem xmlns:ds="http://schemas.openxmlformats.org/officeDocument/2006/customXml" ds:itemID="{B0ABAC91-C1EB-481F-B60B-A09C54856BBA}">
+  <ds:schemaRefs>
+    <ds:schemaRef ds:uri="http://purl.org/dc/terms/"/>
+    <ds:schemaRef ds:uri="e06ed288-fd75-4b50-bbed-f5a5df88c31c"/>
+    <ds:schemaRef ds:uri="http://www.w3.org/XML/1998/namespace"/>
+    <ds:schemaRef ds:uri="http://schemas.microsoft.com/office/infopath/2007/PartnerControls"/>
+    <ds:schemaRef ds:uri="http://schemas.microsoft.com/office/2006/metadata/properties"/>
+    <ds:schemaRef ds:uri="http://purl.org/dc/elements/1.1/"/>
+    <ds:schemaRef ds:uri="http://schemas.microsoft.com/office/2006/documentManagement/types"/>
+    <ds:schemaRef ds:uri="92c41bee-f0ee-4aa6-9399-a35fbb883510"/>
+    <ds:schemaRef ds:uri="http://schemas.openxmlformats.org/package/2006/metadata/core-properties"/>
+    <ds:schemaRef ds:uri="http://purl.org/dc/dcmitype/"/>
+  </ds:schemaRefs>
+</ds:datastoreItem>
+</file>
+
+<file path=customXml/itemProps3.xml><?xml version="1.0" encoding="utf-8"?>
 <ds:datastoreItem xmlns:ds="http://schemas.openxmlformats.org/officeDocument/2006/customXml" ds:itemID="{89A51EB2-5938-4503-962D-41917281861E}">
   <ds:schemaRefs>
     <ds:schemaRef ds:uri="http://schemas.microsoft.com/sharepoint/v3/contenttype/forms"/>
   </ds:schemaRefs>
 </ds:datastoreItem>
-</file>
-
-<file path=customXml/itemProps3.xml><?xml version="1.0" encoding="utf-8"?>
-<ds:datastoreItem xmlns:ds="http://schemas.openxmlformats.org/officeDocument/2006/customXml" ds:itemID="{B0ABAC91-C1EB-481F-B60B-A09C54856BBA}">
-  <ds:schemaRefs>
-    <ds:schemaRef ds:uri="e06ed288-fd75-4b50-bbed-f5a5df88c31c"/>
-    <ds:schemaRef ds:uri="http://schemas.openxmlformats.org/package/2006/metadata/core-properties"/>
-    <ds:schemaRef ds:uri="http://schemas.microsoft.com/office/infopath/2007/PartnerControls"/>
-    <ds:schemaRef ds:uri="http://purl.org/dc/elements/1.1/"/>
-    <ds:schemaRef ds:uri="92c41bee-f0ee-4aa6-9399-a35fbb883510"/>
-    <ds:schemaRef ds:uri="http://purl.org/dc/terms/"/>
-    <ds:schemaRef ds:uri="http://schemas.microsoft.com/office/2006/metadata/properties"/>
-    <ds:schemaRef ds:uri="http://www.w3.org/XML/1998/namespace"/>
-    <ds:schemaRef ds:uri="http://schemas.microsoft.com/office/2006/documentManagement/types"/>
-    <ds:schemaRef ds:uri="http://purl.org/dc/dcmitype/"/>
-  </ds:schemaRefs>
-</ds:datastoreItem>
 </file>
</xml_diff>